<commit_message>
Add 06-Optimizations-2 slides (2025)
</commit_message>
<xml_diff>
--- a/06-Optimizations-2.pptx
+++ b/06-Optimizations-2.pptx
@@ -44,16 +44,17 @@
     <p:sldId id="289" r:id="rId38"/>
     <p:sldId id="290" r:id="rId39"/>
     <p:sldId id="291" r:id="rId40"/>
+    <p:sldId id="292" r:id="rId41"/>
   </p:sldIdLst>
   <p:sldSz cy="6858000" cx="12192000"/>
   <p:notesSz cx="6858000" cy="9144000"/>
   <p:embeddedFontLst>
     <p:embeddedFont>
       <p:font typeface="Helvetica Neue"/>
-      <p:regular r:id="rId41"/>
-      <p:bold r:id="rId42"/>
-      <p:italic r:id="rId43"/>
-      <p:boldItalic r:id="rId44"/>
+      <p:regular r:id="rId42"/>
+      <p:bold r:id="rId43"/>
+      <p:italic r:id="rId44"/>
+      <p:boldItalic r:id="rId45"/>
     </p:embeddedFont>
   </p:embeddedFontLst>
   <p:defaultTextStyle>
@@ -287,7 +288,7 @@
   </p:defaultTextStyle>
   <p:extLst>
     <p:ext uri="GoogleSlidesCustomDataVersion2">
-      <go:slidesCustomData xmlns:go="http://customooxmlschemas.google.com/" r:id="rId45" roundtripDataSignature="AMtx7milQOgKL53VvDW+/Do9sglGsPU4LQ=="/>
+      <go:slidesCustomData xmlns:go="http://customooxmlschemas.google.com/" r:id="rId46" roundtripDataSignature="AMtx7mgDqBu5NxsCYfkUhlCx0H/mAFNS6Q=="/>
     </p:ext>
   </p:extLst>
 </p:presentation>
@@ -999,7 +1000,7 @@
   <p:cSld>
     <p:spTree>
       <p:nvGrpSpPr>
-        <p:cNvPr id="268" name="Shape 268"/>
+        <p:cNvPr id="277" name="Shape 277"/>
         <p:cNvGrpSpPr/>
         <p:nvPr/>
       </p:nvGrpSpPr>
@@ -1013,7 +1014,7 @@
       </p:grpSpPr>
       <p:sp>
         <p:nvSpPr>
-          <p:cNvPr id="269" name="Google Shape;269;g26b5081e801_0_435:notes"/>
+          <p:cNvPr id="278" name="Google Shape;278;g26b5081e801_0_435:notes"/>
           <p:cNvSpPr/>
           <p:nvPr>
             <p:ph idx="2" type="sldImg"/>
@@ -1048,7 +1049,7 @@
       </p:sp>
       <p:sp>
         <p:nvSpPr>
-          <p:cNvPr id="270" name="Google Shape;270;g26b5081e801_0_435:notes"/>
+          <p:cNvPr id="279" name="Google Shape;279;g26b5081e801_0_435:notes"/>
           <p:cNvSpPr txBox="1"/>
           <p:nvPr>
             <p:ph idx="1" type="body"/>
@@ -1098,7 +1099,7 @@
   <p:cSld>
     <p:spTree>
       <p:nvGrpSpPr>
-        <p:cNvPr id="275" name="Shape 275"/>
+        <p:cNvPr id="288" name="Shape 288"/>
         <p:cNvGrpSpPr/>
         <p:nvPr/>
       </p:nvGrpSpPr>
@@ -1112,7 +1113,7 @@
       </p:grpSpPr>
       <p:sp>
         <p:nvSpPr>
-          <p:cNvPr id="276" name="Google Shape;276;p4:notes"/>
+          <p:cNvPr id="289" name="Google Shape;289;p4:notes"/>
           <p:cNvSpPr txBox="1"/>
           <p:nvPr>
             <p:ph idx="1" type="body"/>
@@ -1151,7 +1152,7 @@
       </p:sp>
       <p:sp>
         <p:nvSpPr>
-          <p:cNvPr id="277" name="Google Shape;277;p4:notes"/>
+          <p:cNvPr id="290" name="Google Shape;290;p4:notes"/>
           <p:cNvSpPr/>
           <p:nvPr>
             <p:ph idx="2" type="sldImg"/>
@@ -1197,7 +1198,7 @@
   <p:cSld>
     <p:spTree>
       <p:nvGrpSpPr>
-        <p:cNvPr id="281" name="Shape 281"/>
+        <p:cNvPr id="294" name="Shape 294"/>
         <p:cNvGrpSpPr/>
         <p:nvPr/>
       </p:nvGrpSpPr>
@@ -1211,7 +1212,7 @@
       </p:grpSpPr>
       <p:sp>
         <p:nvSpPr>
-          <p:cNvPr id="282" name="Google Shape;282;p5:notes"/>
+          <p:cNvPr id="295" name="Google Shape;295;p5:notes"/>
           <p:cNvSpPr txBox="1"/>
           <p:nvPr>
             <p:ph idx="1" type="body"/>
@@ -1250,7 +1251,7 @@
       </p:sp>
       <p:sp>
         <p:nvSpPr>
-          <p:cNvPr id="283" name="Google Shape;283;p5:notes"/>
+          <p:cNvPr id="296" name="Google Shape;296;p5:notes"/>
           <p:cNvSpPr/>
           <p:nvPr>
             <p:ph idx="2" type="sldImg"/>
@@ -1296,7 +1297,7 @@
   <p:cSld>
     <p:spTree>
       <p:nvGrpSpPr>
-        <p:cNvPr id="287" name="Shape 287"/>
+        <p:cNvPr id="300" name="Shape 300"/>
         <p:cNvGrpSpPr/>
         <p:nvPr/>
       </p:nvGrpSpPr>
@@ -1310,7 +1311,7 @@
       </p:grpSpPr>
       <p:sp>
         <p:nvSpPr>
-          <p:cNvPr id="288" name="Google Shape;288;p6:notes"/>
+          <p:cNvPr id="301" name="Google Shape;301;p6:notes"/>
           <p:cNvSpPr txBox="1"/>
           <p:nvPr>
             <p:ph idx="1" type="body"/>
@@ -1349,7 +1350,7 @@
       </p:sp>
       <p:sp>
         <p:nvSpPr>
-          <p:cNvPr id="289" name="Google Shape;289;p6:notes"/>
+          <p:cNvPr id="302" name="Google Shape;302;p6:notes"/>
           <p:cNvSpPr/>
           <p:nvPr>
             <p:ph idx="2" type="sldImg"/>
@@ -1395,7 +1396,7 @@
   <p:cSld>
     <p:spTree>
       <p:nvGrpSpPr>
-        <p:cNvPr id="293" name="Shape 293"/>
+        <p:cNvPr id="306" name="Shape 306"/>
         <p:cNvGrpSpPr/>
         <p:nvPr/>
       </p:nvGrpSpPr>
@@ -1409,7 +1410,7 @@
       </p:grpSpPr>
       <p:sp>
         <p:nvSpPr>
-          <p:cNvPr id="294" name="Google Shape;294;g26b5081e801_0_456:notes"/>
+          <p:cNvPr id="307" name="Google Shape;307;g26b5081e801_0_456:notes"/>
           <p:cNvSpPr/>
           <p:nvPr>
             <p:ph idx="2" type="sldImg"/>
@@ -1444,7 +1445,7 @@
       </p:sp>
       <p:sp>
         <p:nvSpPr>
-          <p:cNvPr id="295" name="Google Shape;295;g26b5081e801_0_456:notes"/>
+          <p:cNvPr id="308" name="Google Shape;308;g26b5081e801_0_456:notes"/>
           <p:cNvSpPr txBox="1"/>
           <p:nvPr>
             <p:ph idx="1" type="body"/>
@@ -1494,7 +1495,7 @@
   <p:cSld>
     <p:spTree>
       <p:nvGrpSpPr>
-        <p:cNvPr id="299" name="Shape 299"/>
+        <p:cNvPr id="312" name="Shape 312"/>
         <p:cNvGrpSpPr/>
         <p:nvPr/>
       </p:nvGrpSpPr>
@@ -1508,7 +1509,7 @@
       </p:grpSpPr>
       <p:sp>
         <p:nvSpPr>
-          <p:cNvPr id="300" name="Google Shape;300;p7:notes"/>
+          <p:cNvPr id="313" name="Google Shape;313;p7:notes"/>
           <p:cNvSpPr txBox="1"/>
           <p:nvPr>
             <p:ph idx="1" type="body"/>
@@ -1547,7 +1548,7 @@
       </p:sp>
       <p:sp>
         <p:nvSpPr>
-          <p:cNvPr id="301" name="Google Shape;301;p7:notes"/>
+          <p:cNvPr id="314" name="Google Shape;314;p7:notes"/>
           <p:cNvSpPr/>
           <p:nvPr>
             <p:ph idx="2" type="sldImg"/>
@@ -1593,7 +1594,7 @@
   <p:cSld>
     <p:spTree>
       <p:nvGrpSpPr>
-        <p:cNvPr id="306" name="Shape 306"/>
+        <p:cNvPr id="319" name="Shape 319"/>
         <p:cNvGrpSpPr/>
         <p:nvPr/>
       </p:nvGrpSpPr>
@@ -1607,7 +1608,7 @@
       </p:grpSpPr>
       <p:sp>
         <p:nvSpPr>
-          <p:cNvPr id="307" name="Google Shape;307;p8:notes"/>
+          <p:cNvPr id="320" name="Google Shape;320;p8:notes"/>
           <p:cNvSpPr txBox="1"/>
           <p:nvPr>
             <p:ph idx="1" type="body"/>
@@ -1646,7 +1647,7 @@
       </p:sp>
       <p:sp>
         <p:nvSpPr>
-          <p:cNvPr id="308" name="Google Shape;308;p8:notes"/>
+          <p:cNvPr id="321" name="Google Shape;321;p8:notes"/>
           <p:cNvSpPr/>
           <p:nvPr>
             <p:ph idx="2" type="sldImg"/>
@@ -1692,7 +1693,7 @@
   <p:cSld>
     <p:spTree>
       <p:nvGrpSpPr>
-        <p:cNvPr id="313" name="Shape 313"/>
+        <p:cNvPr id="326" name="Shape 326"/>
         <p:cNvGrpSpPr/>
         <p:nvPr/>
       </p:nvGrpSpPr>
@@ -1706,7 +1707,7 @@
       </p:grpSpPr>
       <p:sp>
         <p:nvSpPr>
-          <p:cNvPr id="314" name="Google Shape;314;p9:notes"/>
+          <p:cNvPr id="327" name="Google Shape;327;p9:notes"/>
           <p:cNvSpPr txBox="1"/>
           <p:nvPr>
             <p:ph idx="1" type="body"/>
@@ -1745,7 +1746,7 @@
       </p:sp>
       <p:sp>
         <p:nvSpPr>
-          <p:cNvPr id="315" name="Google Shape;315;p9:notes"/>
+          <p:cNvPr id="328" name="Google Shape;328;p9:notes"/>
           <p:cNvSpPr/>
           <p:nvPr>
             <p:ph idx="2" type="sldImg"/>
@@ -1791,7 +1792,7 @@
   <p:cSld>
     <p:spTree>
       <p:nvGrpSpPr>
-        <p:cNvPr id="320" name="Shape 320"/>
+        <p:cNvPr id="333" name="Shape 333"/>
         <p:cNvGrpSpPr/>
         <p:nvPr/>
       </p:nvGrpSpPr>
@@ -1805,7 +1806,7 @@
       </p:grpSpPr>
       <p:sp>
         <p:nvSpPr>
-          <p:cNvPr id="321" name="Google Shape;321;p10:notes"/>
+          <p:cNvPr id="334" name="Google Shape;334;p10:notes"/>
           <p:cNvSpPr txBox="1"/>
           <p:nvPr>
             <p:ph idx="1" type="body"/>
@@ -1844,7 +1845,7 @@
       </p:sp>
       <p:sp>
         <p:nvSpPr>
-          <p:cNvPr id="322" name="Google Shape;322;p10:notes"/>
+          <p:cNvPr id="335" name="Google Shape;335;p10:notes"/>
           <p:cNvSpPr/>
           <p:nvPr>
             <p:ph idx="2" type="sldImg"/>
@@ -1890,7 +1891,7 @@
   <p:cSld>
     <p:spTree>
       <p:nvGrpSpPr>
-        <p:cNvPr id="326" name="Shape 326"/>
+        <p:cNvPr id="339" name="Shape 339"/>
         <p:cNvGrpSpPr/>
         <p:nvPr/>
       </p:nvGrpSpPr>
@@ -1904,7 +1905,7 @@
       </p:grpSpPr>
       <p:sp>
         <p:nvSpPr>
-          <p:cNvPr id="327" name="Google Shape;327;p11:notes"/>
+          <p:cNvPr id="340" name="Google Shape;340;p11:notes"/>
           <p:cNvSpPr txBox="1"/>
           <p:nvPr>
             <p:ph idx="1" type="body"/>
@@ -1943,7 +1944,7 @@
       </p:sp>
       <p:sp>
         <p:nvSpPr>
-          <p:cNvPr id="328" name="Google Shape;328;p11:notes"/>
+          <p:cNvPr id="341" name="Google Shape;341;p11:notes"/>
           <p:cNvSpPr/>
           <p:nvPr>
             <p:ph idx="2" type="sldImg"/>
@@ -2088,7 +2089,7 @@
   <p:cSld>
     <p:spTree>
       <p:nvGrpSpPr>
-        <p:cNvPr id="333" name="Shape 333"/>
+        <p:cNvPr id="346" name="Shape 346"/>
         <p:cNvGrpSpPr/>
         <p:nvPr/>
       </p:nvGrpSpPr>
@@ -2102,7 +2103,7 @@
       </p:grpSpPr>
       <p:sp>
         <p:nvSpPr>
-          <p:cNvPr id="334" name="Google Shape;334;p12:notes"/>
+          <p:cNvPr id="347" name="Google Shape;347;p12:notes"/>
           <p:cNvSpPr txBox="1"/>
           <p:nvPr>
             <p:ph idx="1" type="body"/>
@@ -2141,7 +2142,7 @@
       </p:sp>
       <p:sp>
         <p:nvSpPr>
-          <p:cNvPr id="335" name="Google Shape;335;p12:notes"/>
+          <p:cNvPr id="348" name="Google Shape;348;p12:notes"/>
           <p:cNvSpPr/>
           <p:nvPr>
             <p:ph idx="2" type="sldImg"/>
@@ -2187,7 +2188,7 @@
   <p:cSld>
     <p:spTree>
       <p:nvGrpSpPr>
-        <p:cNvPr id="340" name="Shape 340"/>
+        <p:cNvPr id="353" name="Shape 353"/>
         <p:cNvGrpSpPr/>
         <p:nvPr/>
       </p:nvGrpSpPr>
@@ -2201,7 +2202,7 @@
       </p:grpSpPr>
       <p:sp>
         <p:nvSpPr>
-          <p:cNvPr id="341" name="Google Shape;341;p13:notes"/>
+          <p:cNvPr id="354" name="Google Shape;354;p13:notes"/>
           <p:cNvSpPr txBox="1"/>
           <p:nvPr>
             <p:ph idx="1" type="body"/>
@@ -2240,7 +2241,7 @@
       </p:sp>
       <p:sp>
         <p:nvSpPr>
-          <p:cNvPr id="342" name="Google Shape;342;p13:notes"/>
+          <p:cNvPr id="355" name="Google Shape;355;p13:notes"/>
           <p:cNvSpPr/>
           <p:nvPr>
             <p:ph idx="2" type="sldImg"/>
@@ -2286,7 +2287,7 @@
   <p:cSld>
     <p:spTree>
       <p:nvGrpSpPr>
-        <p:cNvPr id="347" name="Shape 347"/>
+        <p:cNvPr id="360" name="Shape 360"/>
         <p:cNvGrpSpPr/>
         <p:nvPr/>
       </p:nvGrpSpPr>
@@ -2300,7 +2301,7 @@
       </p:grpSpPr>
       <p:sp>
         <p:nvSpPr>
-          <p:cNvPr id="348" name="Google Shape;348;p14:notes"/>
+          <p:cNvPr id="361" name="Google Shape;361;p14:notes"/>
           <p:cNvSpPr txBox="1"/>
           <p:nvPr>
             <p:ph idx="1" type="body"/>
@@ -2339,7 +2340,7 @@
       </p:sp>
       <p:sp>
         <p:nvSpPr>
-          <p:cNvPr id="349" name="Google Shape;349;p14:notes"/>
+          <p:cNvPr id="362" name="Google Shape;362;p14:notes"/>
           <p:cNvSpPr/>
           <p:nvPr>
             <p:ph idx="2" type="sldImg"/>
@@ -2385,7 +2386,7 @@
   <p:cSld>
     <p:spTree>
       <p:nvGrpSpPr>
-        <p:cNvPr id="354" name="Shape 354"/>
+        <p:cNvPr id="367" name="Shape 367"/>
         <p:cNvGrpSpPr/>
         <p:nvPr/>
       </p:nvGrpSpPr>
@@ -2399,7 +2400,7 @@
       </p:grpSpPr>
       <p:sp>
         <p:nvSpPr>
-          <p:cNvPr id="355" name="Google Shape;355;p15:notes"/>
+          <p:cNvPr id="368" name="Google Shape;368;p15:notes"/>
           <p:cNvSpPr txBox="1"/>
           <p:nvPr>
             <p:ph idx="1" type="body"/>
@@ -2438,7 +2439,7 @@
       </p:sp>
       <p:sp>
         <p:nvSpPr>
-          <p:cNvPr id="356" name="Google Shape;356;p15:notes"/>
+          <p:cNvPr id="369" name="Google Shape;369;p15:notes"/>
           <p:cNvSpPr/>
           <p:nvPr>
             <p:ph idx="2" type="sldImg"/>
@@ -2484,7 +2485,7 @@
   <p:cSld>
     <p:spTree>
       <p:nvGrpSpPr>
-        <p:cNvPr id="361" name="Shape 361"/>
+        <p:cNvPr id="374" name="Shape 374"/>
         <p:cNvGrpSpPr/>
         <p:nvPr/>
       </p:nvGrpSpPr>
@@ -2498,7 +2499,7 @@
       </p:grpSpPr>
       <p:sp>
         <p:nvSpPr>
-          <p:cNvPr id="362" name="Google Shape;362;p16:notes"/>
+          <p:cNvPr id="375" name="Google Shape;375;p16:notes"/>
           <p:cNvSpPr txBox="1"/>
           <p:nvPr>
             <p:ph idx="1" type="body"/>
@@ -2537,7 +2538,7 @@
       </p:sp>
       <p:sp>
         <p:nvSpPr>
-          <p:cNvPr id="363" name="Google Shape;363;p16:notes"/>
+          <p:cNvPr id="376" name="Google Shape;376;p16:notes"/>
           <p:cNvSpPr/>
           <p:nvPr>
             <p:ph idx="2" type="sldImg"/>
@@ -2583,7 +2584,7 @@
   <p:cSld>
     <p:spTree>
       <p:nvGrpSpPr>
-        <p:cNvPr id="368" name="Shape 368"/>
+        <p:cNvPr id="381" name="Shape 381"/>
         <p:cNvGrpSpPr/>
         <p:nvPr/>
       </p:nvGrpSpPr>
@@ -2597,7 +2598,7 @@
       </p:grpSpPr>
       <p:sp>
         <p:nvSpPr>
-          <p:cNvPr id="369" name="Google Shape;369;p17:notes"/>
+          <p:cNvPr id="382" name="Google Shape;382;p17:notes"/>
           <p:cNvSpPr txBox="1"/>
           <p:nvPr>
             <p:ph idx="1" type="body"/>
@@ -2636,7 +2637,7 @@
       </p:sp>
       <p:sp>
         <p:nvSpPr>
-          <p:cNvPr id="370" name="Google Shape;370;p17:notes"/>
+          <p:cNvPr id="383" name="Google Shape;383;p17:notes"/>
           <p:cNvSpPr/>
           <p:nvPr>
             <p:ph idx="2" type="sldImg"/>
@@ -2682,7 +2683,7 @@
   <p:cSld>
     <p:spTree>
       <p:nvGrpSpPr>
-        <p:cNvPr id="375" name="Shape 375"/>
+        <p:cNvPr id="388" name="Shape 388"/>
         <p:cNvGrpSpPr/>
         <p:nvPr/>
       </p:nvGrpSpPr>
@@ -2696,7 +2697,7 @@
       </p:grpSpPr>
       <p:sp>
         <p:nvSpPr>
-          <p:cNvPr id="376" name="Google Shape;376;p18:notes"/>
+          <p:cNvPr id="389" name="Google Shape;389;p18:notes"/>
           <p:cNvSpPr txBox="1"/>
           <p:nvPr>
             <p:ph idx="1" type="body"/>
@@ -2735,7 +2736,7 @@
       </p:sp>
       <p:sp>
         <p:nvSpPr>
-          <p:cNvPr id="377" name="Google Shape;377;p18:notes"/>
+          <p:cNvPr id="390" name="Google Shape;390;p18:notes"/>
           <p:cNvSpPr/>
           <p:nvPr>
             <p:ph idx="2" type="sldImg"/>
@@ -2781,7 +2782,7 @@
   <p:cSld>
     <p:spTree>
       <p:nvGrpSpPr>
-        <p:cNvPr id="382" name="Shape 382"/>
+        <p:cNvPr id="395" name="Shape 395"/>
         <p:cNvGrpSpPr/>
         <p:nvPr/>
       </p:nvGrpSpPr>
@@ -2795,7 +2796,7 @@
       </p:grpSpPr>
       <p:sp>
         <p:nvSpPr>
-          <p:cNvPr id="383" name="Google Shape;383;p19:notes"/>
+          <p:cNvPr id="396" name="Google Shape;396;p19:notes"/>
           <p:cNvSpPr txBox="1"/>
           <p:nvPr>
             <p:ph idx="1" type="body"/>
@@ -2834,7 +2835,7 @@
       </p:sp>
       <p:sp>
         <p:nvSpPr>
-          <p:cNvPr id="384" name="Google Shape;384;p19:notes"/>
+          <p:cNvPr id="397" name="Google Shape;397;p19:notes"/>
           <p:cNvSpPr/>
           <p:nvPr>
             <p:ph idx="2" type="sldImg"/>
@@ -2880,7 +2881,7 @@
   <p:cSld>
     <p:spTree>
       <p:nvGrpSpPr>
-        <p:cNvPr id="389" name="Shape 389"/>
+        <p:cNvPr id="402" name="Shape 402"/>
         <p:cNvGrpSpPr/>
         <p:nvPr/>
       </p:nvGrpSpPr>
@@ -2894,7 +2895,7 @@
       </p:grpSpPr>
       <p:sp>
         <p:nvSpPr>
-          <p:cNvPr id="390" name="Google Shape;390;g2c3fbe12272_1_3:notes"/>
+          <p:cNvPr id="403" name="Google Shape;403;g2c3fbe12272_1_3:notes"/>
           <p:cNvSpPr/>
           <p:nvPr>
             <p:ph idx="2" type="sldImg"/>
@@ -2929,7 +2930,7 @@
       </p:sp>
       <p:sp>
         <p:nvSpPr>
-          <p:cNvPr id="391" name="Google Shape;391;g2c3fbe12272_1_3:notes"/>
+          <p:cNvPr id="404" name="Google Shape;404;g2c3fbe12272_1_3:notes"/>
           <p:cNvSpPr txBox="1"/>
           <p:nvPr>
             <p:ph idx="1" type="body"/>
@@ -2979,7 +2980,7 @@
   <p:cSld>
     <p:spTree>
       <p:nvGrpSpPr>
-        <p:cNvPr id="396" name="Shape 396"/>
+        <p:cNvPr id="409" name="Shape 409"/>
         <p:cNvGrpSpPr/>
         <p:nvPr/>
       </p:nvGrpSpPr>
@@ -2993,7 +2994,7 @@
       </p:grpSpPr>
       <p:sp>
         <p:nvSpPr>
-          <p:cNvPr id="397" name="Google Shape;397;p20:notes"/>
+          <p:cNvPr id="410" name="Google Shape;410;p20:notes"/>
           <p:cNvSpPr txBox="1"/>
           <p:nvPr>
             <p:ph idx="1" type="body"/>
@@ -3032,7 +3033,7 @@
       </p:sp>
       <p:sp>
         <p:nvSpPr>
-          <p:cNvPr id="398" name="Google Shape;398;p20:notes"/>
+          <p:cNvPr id="411" name="Google Shape;411;p20:notes"/>
           <p:cNvSpPr/>
           <p:nvPr>
             <p:ph idx="2" type="sldImg"/>
@@ -3177,7 +3178,7 @@
   <p:cSld>
     <p:spTree>
       <p:nvGrpSpPr>
-        <p:cNvPr id="404" name="Shape 404"/>
+        <p:cNvPr id="417" name="Shape 417"/>
         <p:cNvGrpSpPr/>
         <p:nvPr/>
       </p:nvGrpSpPr>
@@ -3191,7 +3192,7 @@
       </p:grpSpPr>
       <p:sp>
         <p:nvSpPr>
-          <p:cNvPr id="405" name="Google Shape;405;p21:notes"/>
+          <p:cNvPr id="418" name="Google Shape;418;p21:notes"/>
           <p:cNvSpPr txBox="1"/>
           <p:nvPr>
             <p:ph idx="1" type="body"/>
@@ -3230,7 +3231,7 @@
       </p:sp>
       <p:sp>
         <p:nvSpPr>
-          <p:cNvPr id="406" name="Google Shape;406;p21:notes"/>
+          <p:cNvPr id="419" name="Google Shape;419;p21:notes"/>
           <p:cNvSpPr/>
           <p:nvPr>
             <p:ph idx="2" type="sldImg"/>
@@ -3276,7 +3277,7 @@
   <p:cSld>
     <p:spTree>
       <p:nvGrpSpPr>
-        <p:cNvPr id="411" name="Shape 411"/>
+        <p:cNvPr id="424" name="Shape 424"/>
         <p:cNvGrpSpPr/>
         <p:nvPr/>
       </p:nvGrpSpPr>
@@ -3290,7 +3291,7 @@
       </p:grpSpPr>
       <p:sp>
         <p:nvSpPr>
-          <p:cNvPr id="412" name="Google Shape;412;g26aa17c3ece_0_8:notes"/>
+          <p:cNvPr id="425" name="Google Shape;425;g26aa17c3ece_0_8:notes"/>
           <p:cNvSpPr/>
           <p:nvPr>
             <p:ph idx="2" type="sldImg"/>
@@ -3325,7 +3326,7 @@
       </p:sp>
       <p:sp>
         <p:nvSpPr>
-          <p:cNvPr id="413" name="Google Shape;413;g26aa17c3ece_0_8:notes"/>
+          <p:cNvPr id="426" name="Google Shape;426;g26aa17c3ece_0_8:notes"/>
           <p:cNvSpPr txBox="1"/>
           <p:nvPr>
             <p:ph idx="1" type="body"/>
@@ -3375,7 +3376,7 @@
   <p:cSld>
     <p:spTree>
       <p:nvGrpSpPr>
-        <p:cNvPr id="417" name="Shape 417"/>
+        <p:cNvPr id="430" name="Shape 430"/>
         <p:cNvGrpSpPr/>
         <p:nvPr/>
       </p:nvGrpSpPr>
@@ -3389,7 +3390,7 @@
       </p:grpSpPr>
       <p:sp>
         <p:nvSpPr>
-          <p:cNvPr id="418" name="Google Shape;418;p22:notes"/>
+          <p:cNvPr id="431" name="Google Shape;431;p22:notes"/>
           <p:cNvSpPr txBox="1"/>
           <p:nvPr>
             <p:ph idx="1" type="body"/>
@@ -3428,7 +3429,7 @@
       </p:sp>
       <p:sp>
         <p:nvSpPr>
-          <p:cNvPr id="419" name="Google Shape;419;p22:notes"/>
+          <p:cNvPr id="432" name="Google Shape;432;p22:notes"/>
           <p:cNvSpPr/>
           <p:nvPr>
             <p:ph idx="2" type="sldImg"/>
@@ -3474,7 +3475,7 @@
   <p:cSld>
     <p:spTree>
       <p:nvGrpSpPr>
-        <p:cNvPr id="423" name="Shape 423"/>
+        <p:cNvPr id="436" name="Shape 436"/>
         <p:cNvGrpSpPr/>
         <p:nvPr/>
       </p:nvGrpSpPr>
@@ -3488,7 +3489,7 @@
       </p:grpSpPr>
       <p:sp>
         <p:nvSpPr>
-          <p:cNvPr id="424" name="Google Shape;424;g26b5081e801_0_19:notes"/>
+          <p:cNvPr id="437" name="Google Shape;437;g26b5081e801_0_19:notes"/>
           <p:cNvSpPr txBox="1"/>
           <p:nvPr>
             <p:ph idx="1" type="body"/>
@@ -3527,7 +3528,7 @@
       </p:sp>
       <p:sp>
         <p:nvSpPr>
-          <p:cNvPr id="425" name="Google Shape;425;g26b5081e801_0_19:notes"/>
+          <p:cNvPr id="438" name="Google Shape;438;g26b5081e801_0_19:notes"/>
           <p:cNvSpPr/>
           <p:nvPr>
             <p:ph idx="2" type="sldImg"/>
@@ -3573,7 +3574,7 @@
   <p:cSld>
     <p:spTree>
       <p:nvGrpSpPr>
-        <p:cNvPr id="429" name="Shape 429"/>
+        <p:cNvPr id="442" name="Shape 442"/>
         <p:cNvGrpSpPr/>
         <p:nvPr/>
       </p:nvGrpSpPr>
@@ -3587,7 +3588,7 @@
       </p:grpSpPr>
       <p:sp>
         <p:nvSpPr>
-          <p:cNvPr id="430" name="Google Shape;430;g26b5081e801_0_477:notes"/>
+          <p:cNvPr id="443" name="Google Shape;443;g26b5081e801_0_477:notes"/>
           <p:cNvSpPr/>
           <p:nvPr>
             <p:ph idx="2" type="sldImg"/>
@@ -3622,7 +3623,7 @@
       </p:sp>
       <p:sp>
         <p:nvSpPr>
-          <p:cNvPr id="431" name="Google Shape;431;g26b5081e801_0_477:notes"/>
+          <p:cNvPr id="444" name="Google Shape;444;g26b5081e801_0_477:notes"/>
           <p:cNvSpPr txBox="1"/>
           <p:nvPr>
             <p:ph idx="1" type="body"/>
@@ -3672,7 +3673,7 @@
   <p:cSld>
     <p:spTree>
       <p:nvGrpSpPr>
-        <p:cNvPr id="438" name="Shape 438"/>
+        <p:cNvPr id="451" name="Shape 451"/>
         <p:cNvGrpSpPr/>
         <p:nvPr/>
       </p:nvGrpSpPr>
@@ -3686,46 +3687,7 @@
       </p:grpSpPr>
       <p:sp>
         <p:nvSpPr>
-          <p:cNvPr id="439" name="Google Shape;439;p23:notes"/>
-          <p:cNvSpPr txBox="1"/>
-          <p:nvPr>
-            <p:ph idx="1" type="body"/>
-          </p:nvPr>
-        </p:nvSpPr>
-        <p:spPr>
-          <a:xfrm>
-            <a:off x="914400" y="4343400"/>
-            <a:ext cx="5029200" cy="4114800"/>
-          </a:xfrm>
-          <a:prstGeom prst="rect">
-            <a:avLst/>
-          </a:prstGeom>
-        </p:spPr>
-        <p:txBody>
-          <a:bodyPr anchorCtr="0" anchor="t" bIns="45700" lIns="91425" spcFirstLastPara="1" rIns="91425" wrap="square" tIns="45700">
-            <a:noAutofit/>
-          </a:bodyPr>
-          <a:lstStyle/>
-          <a:p>
-            <a:pPr indent="0" lvl="0" marL="0" rtl="0" algn="l">
-              <a:spcBef>
-                <a:spcPts val="0"/>
-              </a:spcBef>
-              <a:spcAft>
-                <a:spcPts val="0"/>
-              </a:spcAft>
-              <a:buNone/>
-            </a:pPr>
-            <a:r>
-              <a:t/>
-            </a:r>
-            <a:endParaRPr/>
-          </a:p>
-        </p:txBody>
-      </p:sp>
-      <p:sp>
-        <p:nvSpPr>
-          <p:cNvPr id="440" name="Google Shape;440;p23:notes"/>
+          <p:cNvPr id="452" name="Google Shape;452;g34113910fee_0_0:notes"/>
           <p:cNvSpPr/>
           <p:nvPr>
             <p:ph idx="2" type="sldImg"/>
@@ -3758,6 +3720,45 @@
           </a:custGeom>
         </p:spPr>
       </p:sp>
+      <p:sp>
+        <p:nvSpPr>
+          <p:cNvPr id="453" name="Google Shape;453;g34113910fee_0_0:notes"/>
+          <p:cNvSpPr txBox="1"/>
+          <p:nvPr>
+            <p:ph idx="1" type="body"/>
+          </p:nvPr>
+        </p:nvSpPr>
+        <p:spPr>
+          <a:xfrm>
+            <a:off x="914400" y="4343400"/>
+            <a:ext cx="5029200" cy="4114800"/>
+          </a:xfrm>
+          <a:prstGeom prst="rect">
+            <a:avLst/>
+          </a:prstGeom>
+        </p:spPr>
+        <p:txBody>
+          <a:bodyPr anchorCtr="0" anchor="t" bIns="45700" lIns="91425" spcFirstLastPara="1" rIns="91425" wrap="square" tIns="45700">
+            <a:noAutofit/>
+          </a:bodyPr>
+          <a:lstStyle/>
+          <a:p>
+            <a:pPr indent="0" lvl="0" marL="0" rtl="0" algn="l">
+              <a:spcBef>
+                <a:spcPts val="0"/>
+              </a:spcBef>
+              <a:spcAft>
+                <a:spcPts val="0"/>
+              </a:spcAft>
+              <a:buNone/>
+            </a:pPr>
+            <a:r>
+              <a:t/>
+            </a:r>
+            <a:endParaRPr/>
+          </a:p>
+        </p:txBody>
+      </p:sp>
     </p:spTree>
   </p:cSld>
   <p:clrMapOvr>
@@ -3771,7 +3772,7 @@
   <p:cSld>
     <p:spTree>
       <p:nvGrpSpPr>
-        <p:cNvPr id="444" name="Shape 444"/>
+        <p:cNvPr id="460" name="Shape 460"/>
         <p:cNvGrpSpPr/>
         <p:nvPr/>
       </p:nvGrpSpPr>
@@ -3785,7 +3786,7 @@
       </p:grpSpPr>
       <p:sp>
         <p:nvSpPr>
-          <p:cNvPr id="445" name="Google Shape;445;p24:notes"/>
+          <p:cNvPr id="461" name="Google Shape;461;p23:notes"/>
           <p:cNvSpPr txBox="1"/>
           <p:nvPr>
             <p:ph idx="1" type="body"/>
@@ -3824,7 +3825,106 @@
       </p:sp>
       <p:sp>
         <p:nvSpPr>
-          <p:cNvPr id="446" name="Google Shape;446;p24:notes"/>
+          <p:cNvPr id="462" name="Google Shape;462;p23:notes"/>
+          <p:cNvSpPr/>
+          <p:nvPr>
+            <p:ph idx="2" type="sldImg"/>
+          </p:nvPr>
+        </p:nvSpPr>
+        <p:spPr>
+          <a:xfrm>
+            <a:off x="381000" y="685800"/>
+            <a:ext cx="6096000" cy="3429000"/>
+          </a:xfrm>
+          <a:custGeom>
+            <a:rect b="b" l="l" r="r" t="t"/>
+            <a:pathLst>
+              <a:path extrusionOk="0" h="120000" w="120000">
+                <a:moveTo>
+                  <a:pt x="0" y="0"/>
+                </a:moveTo>
+                <a:lnTo>
+                  <a:pt x="120000" y="0"/>
+                </a:lnTo>
+                <a:lnTo>
+                  <a:pt x="120000" y="120000"/>
+                </a:lnTo>
+                <a:lnTo>
+                  <a:pt x="0" y="120000"/>
+                </a:lnTo>
+                <a:close/>
+              </a:path>
+            </a:pathLst>
+          </a:custGeom>
+        </p:spPr>
+      </p:sp>
+    </p:spTree>
+  </p:cSld>
+  <p:clrMapOvr>
+    <a:masterClrMapping/>
+  </p:clrMapOvr>
+</p:notes>
+</file>
+
+<file path=ppt/notesSlides/notesSlide37.xml><?xml version="1.0" encoding="utf-8"?>
+<p:notes xmlns:a="http://schemas.openxmlformats.org/drawingml/2006/main" xmlns:r="http://schemas.openxmlformats.org/officeDocument/2006/relationships" xmlns:mc="http://schemas.openxmlformats.org/markup-compatibility/2006" xmlns:mv="urn:schemas-microsoft-com:mac:vml" xmlns:p="http://schemas.openxmlformats.org/presentationml/2006/main" xmlns:c="http://schemas.openxmlformats.org/drawingml/2006/chart" xmlns:dgm="http://schemas.openxmlformats.org/drawingml/2006/diagram" xmlns:o="urn:schemas-microsoft-com:office:office" xmlns:v="urn:schemas-microsoft-com:vml" xmlns:pvml="urn:schemas-microsoft-com:office:powerpoint" xmlns:com="http://schemas.openxmlformats.org/drawingml/2006/compatibility" xmlns:p14="http://schemas.microsoft.com/office/powerpoint/2010/main" xmlns:p15="http://schemas.microsoft.com/office/powerpoint/2012/main" xmlns:ahyp="http://schemas.microsoft.com/office/drawing/2018/hyperlinkcolor" showMasterPhAnim="0" showMasterSp="0">
+  <p:cSld>
+    <p:spTree>
+      <p:nvGrpSpPr>
+        <p:cNvPr id="466" name="Shape 466"/>
+        <p:cNvGrpSpPr/>
+        <p:nvPr/>
+      </p:nvGrpSpPr>
+      <p:grpSpPr>
+        <a:xfrm>
+          <a:off x="0" y="0"/>
+          <a:ext cx="0" cy="0"/>
+          <a:chOff x="0" y="0"/>
+          <a:chExt cx="0" cy="0"/>
+        </a:xfrm>
+      </p:grpSpPr>
+      <p:sp>
+        <p:nvSpPr>
+          <p:cNvPr id="467" name="Google Shape;467;p24:notes"/>
+          <p:cNvSpPr txBox="1"/>
+          <p:nvPr>
+            <p:ph idx="1" type="body"/>
+          </p:nvPr>
+        </p:nvSpPr>
+        <p:spPr>
+          <a:xfrm>
+            <a:off x="914400" y="4343400"/>
+            <a:ext cx="5029200" cy="4114800"/>
+          </a:xfrm>
+          <a:prstGeom prst="rect">
+            <a:avLst/>
+          </a:prstGeom>
+        </p:spPr>
+        <p:txBody>
+          <a:bodyPr anchorCtr="0" anchor="t" bIns="45700" lIns="91425" spcFirstLastPara="1" rIns="91425" wrap="square" tIns="45700">
+            <a:noAutofit/>
+          </a:bodyPr>
+          <a:lstStyle/>
+          <a:p>
+            <a:pPr indent="0" lvl="0" marL="0" rtl="0" algn="l">
+              <a:spcBef>
+                <a:spcPts val="0"/>
+              </a:spcBef>
+              <a:spcAft>
+                <a:spcPts val="0"/>
+              </a:spcAft>
+              <a:buNone/>
+            </a:pPr>
+            <a:r>
+              <a:t/>
+            </a:r>
+            <a:endParaRPr/>
+          </a:p>
+        </p:txBody>
+      </p:sp>
+      <p:sp>
+        <p:nvSpPr>
+          <p:cNvPr id="468" name="Google Shape;468;p24:notes"/>
           <p:cNvSpPr/>
           <p:nvPr>
             <p:ph idx="2" type="sldImg"/>
@@ -4365,7 +4465,7 @@
   <p:cSld>
     <p:spTree>
       <p:nvGrpSpPr>
-        <p:cNvPr id="260" name="Shape 260"/>
+        <p:cNvPr id="264" name="Shape 264"/>
         <p:cNvGrpSpPr/>
         <p:nvPr/>
       </p:nvGrpSpPr>
@@ -4379,7 +4479,7 @@
       </p:grpSpPr>
       <p:sp>
         <p:nvSpPr>
-          <p:cNvPr id="261" name="Google Shape;261;g26b5081e801_0_443:notes"/>
+          <p:cNvPr id="265" name="Google Shape;265;g26b5081e801_0_443:notes"/>
           <p:cNvSpPr/>
           <p:nvPr>
             <p:ph idx="2" type="sldImg"/>
@@ -4414,7 +4514,7 @@
       </p:sp>
       <p:sp>
         <p:nvSpPr>
-          <p:cNvPr id="262" name="Google Shape;262;g26b5081e801_0_443:notes"/>
+          <p:cNvPr id="266" name="Google Shape;266;g26b5081e801_0_443:notes"/>
           <p:cNvSpPr txBox="1"/>
           <p:nvPr>
             <p:ph idx="1" type="body"/>
@@ -25072,7 +25172,7 @@
   <p:cSld>
     <p:spTree>
       <p:nvGrpSpPr>
-        <p:cNvPr id="271" name="Shape 271"/>
+        <p:cNvPr id="280" name="Shape 280"/>
         <p:cNvGrpSpPr/>
         <p:nvPr/>
       </p:nvGrpSpPr>
@@ -25086,7 +25186,7 @@
       </p:grpSpPr>
       <p:sp>
         <p:nvSpPr>
-          <p:cNvPr id="272" name="Google Shape;272;g26b5081e801_0_435"/>
+          <p:cNvPr id="281" name="Google Shape;281;g26b5081e801_0_435"/>
           <p:cNvSpPr txBox="1"/>
           <p:nvPr>
             <p:ph type="title"/>
@@ -25126,7 +25226,7 @@
       </p:sp>
       <p:sp>
         <p:nvSpPr>
-          <p:cNvPr id="273" name="Google Shape;273;g26b5081e801_0_435"/>
+          <p:cNvPr id="282" name="Google Shape;282;g26b5081e801_0_435"/>
           <p:cNvSpPr txBox="1"/>
           <p:nvPr>
             <p:ph idx="1" type="body"/>
@@ -25177,31 +25277,18 @@
               <a:rPr lang="en-US"/>
               <a:t>CFG simplification: </a:t>
             </a:r>
-            <a:r>
-              <a:rPr lang="en-US" u="sng">
-                <a:solidFill>
-                  <a:schemeClr val="hlink"/>
-                </a:solidFill>
-                <a:hlinkClick r:id="rId3"/>
-              </a:rPr>
-              <a:t>https://godbolt.org/z/hK4ndPbcq</a:t>
-            </a:r>
-            <a:r>
-              <a:rPr lang="en-US"/>
-              <a:t> </a:t>
-            </a:r>
             <a:endParaRPr/>
           </a:p>
         </p:txBody>
       </p:sp>
       <p:pic>
         <p:nvPicPr>
-          <p:cNvPr id="274" name="Google Shape;274;g26b5081e801_0_435"/>
+          <p:cNvPr id="283" name="Google Shape;283;g26b5081e801_0_435"/>
           <p:cNvPicPr preferRelativeResize="0"/>
           <p:nvPr/>
         </p:nvPicPr>
         <p:blipFill>
-          <a:blip r:embed="rId4">
+          <a:blip r:embed="rId3">
             <a:alphaModFix/>
           </a:blip>
           <a:stretch>
@@ -25222,6 +25309,169 @@
           </a:ln>
         </p:spPr>
       </p:pic>
+      <p:grpSp>
+        <p:nvGrpSpPr>
+          <p:cNvPr id="284" name="Google Shape;284;g26b5081e801_0_435"/>
+          <p:cNvGrpSpPr/>
+          <p:nvPr/>
+        </p:nvGrpSpPr>
+        <p:grpSpPr>
+          <a:xfrm>
+            <a:off x="67275" y="6313238"/>
+            <a:ext cx="5188500" cy="445275"/>
+            <a:chOff x="289925" y="5611838"/>
+            <a:chExt cx="5188500" cy="445275"/>
+          </a:xfrm>
+        </p:grpSpPr>
+        <p:sp>
+          <p:nvSpPr>
+            <p:cNvPr id="285" name="Google Shape;285;g26b5081e801_0_435"/>
+            <p:cNvSpPr/>
+            <p:nvPr/>
+          </p:nvSpPr>
+          <p:spPr>
+            <a:xfrm>
+              <a:off x="289925" y="5611850"/>
+              <a:ext cx="5188500" cy="445200"/>
+            </a:xfrm>
+            <a:prstGeom prst="rect">
+              <a:avLst/>
+            </a:prstGeom>
+            <a:solidFill>
+              <a:srgbClr val="FFFFFF"/>
+            </a:solidFill>
+            <a:ln cap="flat" cmpd="sng" w="9525">
+              <a:solidFill>
+                <a:srgbClr val="000000"/>
+              </a:solidFill>
+              <a:prstDash val="solid"/>
+              <a:round/>
+              <a:headEnd len="sm" w="sm" type="none"/>
+              <a:tailEnd len="sm" w="sm" type="none"/>
+            </a:ln>
+          </p:spPr>
+          <p:txBody>
+            <a:bodyPr anchorCtr="0" anchor="ctr" bIns="91425" lIns="91425" spcFirstLastPara="1" rIns="91425" wrap="square" tIns="91425">
+              <a:noAutofit/>
+            </a:bodyPr>
+            <a:lstStyle/>
+            <a:p>
+              <a:pPr indent="0" lvl="0" marL="0" rtl="0" algn="l">
+                <a:spcBef>
+                  <a:spcPts val="0"/>
+                </a:spcBef>
+                <a:spcAft>
+                  <a:spcPts val="0"/>
+                </a:spcAft>
+                <a:buNone/>
+              </a:pPr>
+              <a:r>
+                <a:t/>
+              </a:r>
+              <a:endParaRPr sz="2400">
+                <a:solidFill>
+                  <a:srgbClr val="000000"/>
+                </a:solidFill>
+              </a:endParaRPr>
+            </a:p>
+          </p:txBody>
+        </p:sp>
+        <p:pic>
+          <p:nvPicPr>
+            <p:cNvPr id="286" name="Google Shape;286;g26b5081e801_0_435"/>
+            <p:cNvPicPr preferRelativeResize="0"/>
+            <p:nvPr/>
+          </p:nvPicPr>
+          <p:blipFill>
+            <a:blip r:embed="rId4">
+              <a:alphaModFix/>
+            </a:blip>
+            <a:stretch>
+              <a:fillRect/>
+            </a:stretch>
+          </p:blipFill>
+          <p:spPr>
+            <a:xfrm>
+              <a:off x="289925" y="5611838"/>
+              <a:ext cx="445275" cy="445275"/>
+            </a:xfrm>
+            <a:prstGeom prst="rect">
+              <a:avLst/>
+            </a:prstGeom>
+            <a:noFill/>
+            <a:ln>
+              <a:noFill/>
+            </a:ln>
+          </p:spPr>
+        </p:pic>
+        <p:sp>
+          <p:nvSpPr>
+            <p:cNvPr id="287" name="Google Shape;287;g26b5081e801_0_435"/>
+            <p:cNvSpPr/>
+            <p:nvPr/>
+          </p:nvSpPr>
+          <p:spPr>
+            <a:xfrm>
+              <a:off x="777375" y="5611850"/>
+              <a:ext cx="4701000" cy="445200"/>
+            </a:xfrm>
+            <a:prstGeom prst="rect">
+              <a:avLst/>
+            </a:prstGeom>
+            <a:solidFill>
+              <a:srgbClr val="FFFFFF"/>
+            </a:solidFill>
+            <a:ln cap="flat" cmpd="sng" w="9525">
+              <a:solidFill>
+                <a:srgbClr val="000000"/>
+              </a:solidFill>
+              <a:prstDash val="solid"/>
+              <a:round/>
+              <a:headEnd len="sm" w="sm" type="none"/>
+              <a:tailEnd len="sm" w="sm" type="none"/>
+            </a:ln>
+          </p:spPr>
+          <p:txBody>
+            <a:bodyPr anchorCtr="0" anchor="ctr" bIns="91425" lIns="91425" spcFirstLastPara="1" rIns="91425" wrap="square" tIns="91425">
+              <a:noAutofit/>
+            </a:bodyPr>
+            <a:lstStyle/>
+            <a:p>
+              <a:pPr indent="0" lvl="0" marL="0" rtl="0" algn="l">
+                <a:lnSpc>
+                  <a:spcPct val="90000"/>
+                </a:lnSpc>
+                <a:spcBef>
+                  <a:spcPts val="0"/>
+                </a:spcBef>
+                <a:spcAft>
+                  <a:spcPts val="0"/>
+                </a:spcAft>
+                <a:buClr>
+                  <a:srgbClr val="000000"/>
+                </a:buClr>
+                <a:buSzPts val="2400"/>
+                <a:buFont typeface="Arial"/>
+                <a:buNone/>
+              </a:pPr>
+              <a:r>
+                <a:rPr lang="en-US" sz="2400" u="sng">
+                  <a:solidFill>
+                    <a:schemeClr val="hlink"/>
+                  </a:solidFill>
+                  <a:hlinkClick r:id="rId5"/>
+                </a:rPr>
+                <a:t>https://godbolt.org/z/hK4ndPbcq</a:t>
+              </a:r>
+              <a:r>
+                <a:rPr lang="en-US" sz="2400"/>
+                <a:t> </a:t>
+              </a:r>
+              <a:endParaRPr sz="2400"/>
+            </a:p>
+          </p:txBody>
+        </p:sp>
+      </p:grpSp>
     </p:spTree>
   </p:cSld>
   <p:clrMapOvr>
@@ -25235,7 +25485,7 @@
   <p:cSld>
     <p:spTree>
       <p:nvGrpSpPr>
-        <p:cNvPr id="278" name="Shape 278"/>
+        <p:cNvPr id="291" name="Shape 291"/>
         <p:cNvGrpSpPr/>
         <p:nvPr/>
       </p:nvGrpSpPr>
@@ -25249,7 +25499,7 @@
       </p:grpSpPr>
       <p:sp>
         <p:nvSpPr>
-          <p:cNvPr id="279" name="Google Shape;279;p4"/>
+          <p:cNvPr id="292" name="Google Shape;292;p4"/>
           <p:cNvSpPr txBox="1"/>
           <p:nvPr>
             <p:ph type="title"/>
@@ -25301,7 +25551,7 @@
       </p:sp>
       <p:sp>
         <p:nvSpPr>
-          <p:cNvPr id="280" name="Google Shape;280;p4"/>
+          <p:cNvPr id="293" name="Google Shape;293;p4"/>
           <p:cNvSpPr txBox="1"/>
           <p:nvPr>
             <p:ph idx="1" type="body"/>
@@ -25466,7 +25716,7 @@
   <p:cSld>
     <p:spTree>
       <p:nvGrpSpPr>
-        <p:cNvPr id="284" name="Shape 284"/>
+        <p:cNvPr id="297" name="Shape 297"/>
         <p:cNvGrpSpPr/>
         <p:nvPr/>
       </p:nvGrpSpPr>
@@ -25480,7 +25730,7 @@
       </p:grpSpPr>
       <p:sp>
         <p:nvSpPr>
-          <p:cNvPr id="285" name="Google Shape;285;p5"/>
+          <p:cNvPr id="298" name="Google Shape;298;p5"/>
           <p:cNvSpPr txBox="1"/>
           <p:nvPr>
             <p:ph type="title"/>
@@ -25532,7 +25782,7 @@
       </p:sp>
       <p:sp>
         <p:nvSpPr>
-          <p:cNvPr id="286" name="Google Shape;286;p5"/>
+          <p:cNvPr id="299" name="Google Shape;299;p5"/>
           <p:cNvSpPr txBox="1"/>
           <p:nvPr>
             <p:ph idx="1" type="body"/>
@@ -25599,6 +25849,26 @@
             <a:r>
               <a:rPr lang="en-US"/>
               <a:t>Induction variable is a variable that gets increased or decreased on each loop iteration</a:t>
+            </a:r>
+            <a:endParaRPr/>
+          </a:p>
+          <a:p>
+            <a:pPr indent="-165100" lvl="0" marL="228600" rtl="0" algn="l">
+              <a:lnSpc>
+                <a:spcPct val="100000"/>
+              </a:lnSpc>
+              <a:spcBef>
+                <a:spcPts val="1200"/>
+              </a:spcBef>
+              <a:spcAft>
+                <a:spcPts val="0"/>
+              </a:spcAft>
+              <a:buSzPts val="1800"/>
+              <a:buChar char="▪"/>
+            </a:pPr>
+            <a:r>
+              <a:rPr lang="en-US"/>
+              <a:t>Loop invariant is the part of a computation inside a loop that remains unchanged (invariant) in each iteration</a:t>
             </a:r>
             <a:endParaRPr/>
           </a:p>
@@ -25629,7 +25899,7 @@
   <p:cSld>
     <p:spTree>
       <p:nvGrpSpPr>
-        <p:cNvPr id="290" name="Shape 290"/>
+        <p:cNvPr id="303" name="Shape 303"/>
         <p:cNvGrpSpPr/>
         <p:nvPr/>
       </p:nvGrpSpPr>
@@ -25643,7 +25913,7 @@
       </p:grpSpPr>
       <p:sp>
         <p:nvSpPr>
-          <p:cNvPr id="291" name="Google Shape;291;p6"/>
+          <p:cNvPr id="304" name="Google Shape;304;p6"/>
           <p:cNvSpPr txBox="1"/>
           <p:nvPr>
             <p:ph type="title"/>
@@ -25695,7 +25965,7 @@
       </p:sp>
       <p:sp>
         <p:nvSpPr>
-          <p:cNvPr id="292" name="Google Shape;292;p6"/>
+          <p:cNvPr id="305" name="Google Shape;305;p6"/>
           <p:cNvSpPr txBox="1"/>
           <p:nvPr>
             <p:ph idx="1" type="body"/>
@@ -25884,7 +26154,7 @@
   <p:cSld>
     <p:spTree>
       <p:nvGrpSpPr>
-        <p:cNvPr id="296" name="Shape 296"/>
+        <p:cNvPr id="309" name="Shape 309"/>
         <p:cNvGrpSpPr/>
         <p:nvPr/>
       </p:nvGrpSpPr>
@@ -25898,7 +26168,7 @@
       </p:grpSpPr>
       <p:sp>
         <p:nvSpPr>
-          <p:cNvPr id="297" name="Google Shape;297;g26b5081e801_0_456"/>
+          <p:cNvPr id="310" name="Google Shape;310;g26b5081e801_0_456"/>
           <p:cNvSpPr txBox="1"/>
           <p:nvPr>
             <p:ph type="title"/>
@@ -25947,7 +26217,7 @@
       </p:sp>
       <p:sp>
         <p:nvSpPr>
-          <p:cNvPr id="298" name="Google Shape;298;g26b5081e801_0_456"/>
+          <p:cNvPr id="311" name="Google Shape;311;g26b5081e801_0_456"/>
           <p:cNvSpPr txBox="1"/>
           <p:nvPr>
             <p:ph idx="1" type="body"/>
@@ -26062,7 +26332,7 @@
   <p:cSld>
     <p:spTree>
       <p:nvGrpSpPr>
-        <p:cNvPr id="302" name="Shape 302"/>
+        <p:cNvPr id="315" name="Shape 315"/>
         <p:cNvGrpSpPr/>
         <p:nvPr/>
       </p:nvGrpSpPr>
@@ -26076,7 +26346,7 @@
       </p:grpSpPr>
       <p:sp>
         <p:nvSpPr>
-          <p:cNvPr id="303" name="Google Shape;303;p7"/>
+          <p:cNvPr id="316" name="Google Shape;316;p7"/>
           <p:cNvSpPr txBox="1"/>
           <p:nvPr>
             <p:ph type="title"/>
@@ -26128,7 +26398,7 @@
       </p:sp>
       <p:pic>
         <p:nvPicPr>
-          <p:cNvPr id="304" name="Google Shape;304;p7"/>
+          <p:cNvPr id="317" name="Google Shape;317;p7"/>
           <p:cNvPicPr preferRelativeResize="0"/>
           <p:nvPr>
             <p:ph idx="1" type="body"/>
@@ -26157,7 +26427,7 @@
       </p:pic>
       <p:sp>
         <p:nvSpPr>
-          <p:cNvPr id="305" name="Google Shape;305;p7"/>
+          <p:cNvPr id="318" name="Google Shape;318;p7"/>
           <p:cNvSpPr txBox="1"/>
           <p:nvPr/>
         </p:nvSpPr>
@@ -26231,7 +26501,7 @@
   <p:cSld>
     <p:spTree>
       <p:nvGrpSpPr>
-        <p:cNvPr id="309" name="Shape 309"/>
+        <p:cNvPr id="322" name="Shape 322"/>
         <p:cNvGrpSpPr/>
         <p:nvPr/>
       </p:nvGrpSpPr>
@@ -26245,7 +26515,7 @@
       </p:grpSpPr>
       <p:sp>
         <p:nvSpPr>
-          <p:cNvPr id="310" name="Google Shape;310;p8"/>
+          <p:cNvPr id="323" name="Google Shape;323;p8"/>
           <p:cNvSpPr txBox="1"/>
           <p:nvPr>
             <p:ph type="title"/>
@@ -26298,7 +26568,7 @@
       </p:sp>
       <p:pic>
         <p:nvPicPr>
-          <p:cNvPr id="311" name="Google Shape;311;p8"/>
+          <p:cNvPr id="324" name="Google Shape;324;p8"/>
           <p:cNvPicPr preferRelativeResize="0"/>
           <p:nvPr>
             <p:ph idx="1" type="body"/>
@@ -26327,7 +26597,7 @@
       </p:pic>
       <p:sp>
         <p:nvSpPr>
-          <p:cNvPr id="312" name="Google Shape;312;p8"/>
+          <p:cNvPr id="325" name="Google Shape;325;p8"/>
           <p:cNvSpPr txBox="1"/>
           <p:nvPr/>
         </p:nvSpPr>
@@ -26403,7 +26673,7 @@
   <p:cSld>
     <p:spTree>
       <p:nvGrpSpPr>
-        <p:cNvPr id="316" name="Shape 316"/>
+        <p:cNvPr id="329" name="Shape 329"/>
         <p:cNvGrpSpPr/>
         <p:nvPr/>
       </p:nvGrpSpPr>
@@ -26417,7 +26687,7 @@
       </p:grpSpPr>
       <p:sp>
         <p:nvSpPr>
-          <p:cNvPr id="317" name="Google Shape;317;p9"/>
+          <p:cNvPr id="330" name="Google Shape;330;p9"/>
           <p:cNvSpPr txBox="1"/>
           <p:nvPr>
             <p:ph type="title"/>
@@ -26469,7 +26739,7 @@
       </p:sp>
       <p:pic>
         <p:nvPicPr>
-          <p:cNvPr id="318" name="Google Shape;318;p9"/>
+          <p:cNvPr id="331" name="Google Shape;331;p9"/>
           <p:cNvPicPr preferRelativeResize="0"/>
           <p:nvPr>
             <p:ph idx="1" type="body"/>
@@ -26498,7 +26768,7 @@
       </p:pic>
       <p:pic>
         <p:nvPicPr>
-          <p:cNvPr id="319" name="Google Shape;319;p9"/>
+          <p:cNvPr id="332" name="Google Shape;332;p9"/>
           <p:cNvPicPr preferRelativeResize="0"/>
           <p:nvPr/>
         </p:nvPicPr>
@@ -26548,7 +26818,7 @@
   <p:cSld>
     <p:spTree>
       <p:nvGrpSpPr>
-        <p:cNvPr id="323" name="Shape 323"/>
+        <p:cNvPr id="336" name="Shape 336"/>
         <p:cNvGrpSpPr/>
         <p:nvPr/>
       </p:nvGrpSpPr>
@@ -26562,7 +26832,7 @@
       </p:grpSpPr>
       <p:sp>
         <p:nvSpPr>
-          <p:cNvPr id="324" name="Google Shape;324;p10"/>
+          <p:cNvPr id="337" name="Google Shape;337;p10"/>
           <p:cNvSpPr txBox="1"/>
           <p:nvPr>
             <p:ph type="title"/>
@@ -26614,7 +26884,7 @@
       </p:sp>
       <p:sp>
         <p:nvSpPr>
-          <p:cNvPr id="325" name="Google Shape;325;p10"/>
+          <p:cNvPr id="338" name="Google Shape;338;p10"/>
           <p:cNvSpPr txBox="1"/>
           <p:nvPr>
             <p:ph idx="1" type="body"/>
@@ -26815,7 +27085,7 @@
   <p:cSld>
     <p:spTree>
       <p:nvGrpSpPr>
-        <p:cNvPr id="329" name="Shape 329"/>
+        <p:cNvPr id="342" name="Shape 342"/>
         <p:cNvGrpSpPr/>
         <p:nvPr/>
       </p:nvGrpSpPr>
@@ -26829,7 +27099,7 @@
       </p:grpSpPr>
       <p:sp>
         <p:nvSpPr>
-          <p:cNvPr id="330" name="Google Shape;330;p11"/>
+          <p:cNvPr id="343" name="Google Shape;343;p11"/>
           <p:cNvSpPr txBox="1"/>
           <p:nvPr>
             <p:ph type="title"/>
@@ -26881,7 +27151,7 @@
       </p:sp>
       <p:pic>
         <p:nvPicPr>
-          <p:cNvPr id="331" name="Google Shape;331;p11"/>
+          <p:cNvPr id="344" name="Google Shape;344;p11"/>
           <p:cNvPicPr preferRelativeResize="0"/>
           <p:nvPr>
             <p:ph idx="1" type="body"/>
@@ -26910,7 +27180,7 @@
       </p:pic>
       <p:pic>
         <p:nvPicPr>
-          <p:cNvPr id="332" name="Google Shape;332;p11"/>
+          <p:cNvPr id="345" name="Google Shape;345;p11"/>
           <p:cNvPicPr preferRelativeResize="0"/>
           <p:nvPr/>
         </p:nvPicPr>
@@ -27452,8 +27722,8 @@
         </p:nvSpPr>
         <p:spPr>
           <a:xfrm>
-            <a:off x="855400" y="4889622"/>
-            <a:ext cx="2861187" cy="471924"/>
+            <a:off x="855413" y="5458947"/>
+            <a:ext cx="2861100" cy="471900"/>
           </a:xfrm>
           <a:prstGeom prst="rect">
             <a:avLst/>
@@ -27526,8 +27796,8 @@
         </p:nvSpPr>
         <p:spPr>
           <a:xfrm>
-            <a:off x="855399" y="5443178"/>
-            <a:ext cx="2861187" cy="471924"/>
+            <a:off x="855424" y="4897528"/>
+            <a:ext cx="2861100" cy="471900"/>
           </a:xfrm>
           <a:prstGeom prst="rect">
             <a:avLst/>
@@ -27809,7 +28079,7 @@
   <p:cSld>
     <p:spTree>
       <p:nvGrpSpPr>
-        <p:cNvPr id="336" name="Shape 336"/>
+        <p:cNvPr id="349" name="Shape 349"/>
         <p:cNvGrpSpPr/>
         <p:nvPr/>
       </p:nvGrpSpPr>
@@ -27823,7 +28093,7 @@
       </p:grpSpPr>
       <p:sp>
         <p:nvSpPr>
-          <p:cNvPr id="337" name="Google Shape;337;p12"/>
+          <p:cNvPr id="350" name="Google Shape;350;p12"/>
           <p:cNvSpPr txBox="1"/>
           <p:nvPr>
             <p:ph type="title"/>
@@ -27875,7 +28145,7 @@
       </p:sp>
       <p:pic>
         <p:nvPicPr>
-          <p:cNvPr id="338" name="Google Shape;338;p12"/>
+          <p:cNvPr id="351" name="Google Shape;351;p12"/>
           <p:cNvPicPr preferRelativeResize="0"/>
           <p:nvPr/>
         </p:nvPicPr>
@@ -27902,7 +28172,7 @@
       </p:pic>
       <p:sp>
         <p:nvSpPr>
-          <p:cNvPr id="339" name="Google Shape;339;p12"/>
+          <p:cNvPr id="352" name="Google Shape;352;p12"/>
           <p:cNvSpPr txBox="1"/>
           <p:nvPr/>
         </p:nvSpPr>
@@ -28002,7 +28272,7 @@
   <p:cSld>
     <p:spTree>
       <p:nvGrpSpPr>
-        <p:cNvPr id="343" name="Shape 343"/>
+        <p:cNvPr id="356" name="Shape 356"/>
         <p:cNvGrpSpPr/>
         <p:nvPr/>
       </p:nvGrpSpPr>
@@ -28016,7 +28286,7 @@
       </p:grpSpPr>
       <p:sp>
         <p:nvSpPr>
-          <p:cNvPr id="344" name="Google Shape;344;p13"/>
+          <p:cNvPr id="357" name="Google Shape;357;p13"/>
           <p:cNvSpPr txBox="1"/>
           <p:nvPr>
             <p:ph type="title"/>
@@ -28068,7 +28338,7 @@
       </p:sp>
       <p:pic>
         <p:nvPicPr>
-          <p:cNvPr id="345" name="Google Shape;345;p13"/>
+          <p:cNvPr id="358" name="Google Shape;358;p13"/>
           <p:cNvPicPr preferRelativeResize="0"/>
           <p:nvPr>
             <p:ph idx="1" type="body"/>
@@ -28097,7 +28367,7 @@
       </p:pic>
       <p:pic>
         <p:nvPicPr>
-          <p:cNvPr id="346" name="Google Shape;346;p13"/>
+          <p:cNvPr id="359" name="Google Shape;359;p13"/>
           <p:cNvPicPr preferRelativeResize="0"/>
           <p:nvPr/>
         </p:nvPicPr>
@@ -28147,7 +28417,7 @@
   <p:cSld>
     <p:spTree>
       <p:nvGrpSpPr>
-        <p:cNvPr id="350" name="Shape 350"/>
+        <p:cNvPr id="363" name="Shape 363"/>
         <p:cNvGrpSpPr/>
         <p:nvPr/>
       </p:nvGrpSpPr>
@@ -28161,7 +28431,7 @@
       </p:grpSpPr>
       <p:sp>
         <p:nvSpPr>
-          <p:cNvPr id="351" name="Google Shape;351;p14"/>
+          <p:cNvPr id="364" name="Google Shape;364;p14"/>
           <p:cNvSpPr txBox="1"/>
           <p:nvPr>
             <p:ph type="title"/>
@@ -28213,7 +28483,7 @@
       </p:sp>
       <p:pic>
         <p:nvPicPr>
-          <p:cNvPr id="352" name="Google Shape;352;p14"/>
+          <p:cNvPr id="365" name="Google Shape;365;p14"/>
           <p:cNvPicPr preferRelativeResize="0"/>
           <p:nvPr>
             <p:ph idx="1" type="body"/>
@@ -28242,7 +28512,7 @@
       </p:pic>
       <p:pic>
         <p:nvPicPr>
-          <p:cNvPr id="353" name="Google Shape;353;p14"/>
+          <p:cNvPr id="366" name="Google Shape;366;p14"/>
           <p:cNvPicPr preferRelativeResize="0"/>
           <p:nvPr/>
         </p:nvPicPr>
@@ -28292,7 +28562,7 @@
   <p:cSld>
     <p:spTree>
       <p:nvGrpSpPr>
-        <p:cNvPr id="357" name="Shape 357"/>
+        <p:cNvPr id="370" name="Shape 370"/>
         <p:cNvGrpSpPr/>
         <p:nvPr/>
       </p:nvGrpSpPr>
@@ -28306,7 +28576,7 @@
       </p:grpSpPr>
       <p:sp>
         <p:nvSpPr>
-          <p:cNvPr id="358" name="Google Shape;358;p15"/>
+          <p:cNvPr id="371" name="Google Shape;371;p15"/>
           <p:cNvSpPr txBox="1"/>
           <p:nvPr>
             <p:ph type="title"/>
@@ -28358,7 +28628,7 @@
       </p:sp>
       <p:pic>
         <p:nvPicPr>
-          <p:cNvPr id="359" name="Google Shape;359;p15"/>
+          <p:cNvPr id="372" name="Google Shape;372;p15"/>
           <p:cNvPicPr preferRelativeResize="0"/>
           <p:nvPr>
             <p:ph idx="1" type="body"/>
@@ -28387,7 +28657,7 @@
       </p:pic>
       <p:pic>
         <p:nvPicPr>
-          <p:cNvPr id="360" name="Google Shape;360;p15"/>
+          <p:cNvPr id="373" name="Google Shape;373;p15"/>
           <p:cNvPicPr preferRelativeResize="0"/>
           <p:nvPr/>
         </p:nvPicPr>
@@ -28438,7 +28708,7 @@
   <p:cSld>
     <p:spTree>
       <p:nvGrpSpPr>
-        <p:cNvPr id="364" name="Shape 364"/>
+        <p:cNvPr id="377" name="Shape 377"/>
         <p:cNvGrpSpPr/>
         <p:nvPr/>
       </p:nvGrpSpPr>
@@ -28452,7 +28722,7 @@
       </p:grpSpPr>
       <p:sp>
         <p:nvSpPr>
-          <p:cNvPr id="365" name="Google Shape;365;p16"/>
+          <p:cNvPr id="378" name="Google Shape;378;p16"/>
           <p:cNvSpPr txBox="1"/>
           <p:nvPr>
             <p:ph type="title"/>
@@ -28504,7 +28774,7 @@
       </p:sp>
       <p:pic>
         <p:nvPicPr>
-          <p:cNvPr id="366" name="Google Shape;366;p16"/>
+          <p:cNvPr id="379" name="Google Shape;379;p16"/>
           <p:cNvPicPr preferRelativeResize="0"/>
           <p:nvPr/>
         </p:nvPicPr>
@@ -28532,7 +28802,7 @@
       </p:pic>
       <p:pic>
         <p:nvPicPr>
-          <p:cNvPr id="367" name="Google Shape;367;p16"/>
+          <p:cNvPr id="380" name="Google Shape;380;p16"/>
           <p:cNvPicPr preferRelativeResize="0"/>
           <p:nvPr/>
         </p:nvPicPr>
@@ -28583,7 +28853,7 @@
   <p:cSld>
     <p:spTree>
       <p:nvGrpSpPr>
-        <p:cNvPr id="371" name="Shape 371"/>
+        <p:cNvPr id="384" name="Shape 384"/>
         <p:cNvGrpSpPr/>
         <p:nvPr/>
       </p:nvGrpSpPr>
@@ -28597,7 +28867,7 @@
       </p:grpSpPr>
       <p:sp>
         <p:nvSpPr>
-          <p:cNvPr id="372" name="Google Shape;372;p17"/>
+          <p:cNvPr id="385" name="Google Shape;385;p17"/>
           <p:cNvSpPr txBox="1"/>
           <p:nvPr>
             <p:ph type="title"/>
@@ -28649,7 +28919,7 @@
       </p:sp>
       <p:pic>
         <p:nvPicPr>
-          <p:cNvPr id="373" name="Google Shape;373;p17"/>
+          <p:cNvPr id="386" name="Google Shape;386;p17"/>
           <p:cNvPicPr preferRelativeResize="0"/>
           <p:nvPr/>
         </p:nvPicPr>
@@ -28676,7 +28946,7 @@
       </p:pic>
       <p:pic>
         <p:nvPicPr>
-          <p:cNvPr id="374" name="Google Shape;374;p17"/>
+          <p:cNvPr id="387" name="Google Shape;387;p17"/>
           <p:cNvPicPr preferRelativeResize="0"/>
           <p:nvPr/>
         </p:nvPicPr>
@@ -28726,7 +28996,7 @@
   <p:cSld>
     <p:spTree>
       <p:nvGrpSpPr>
-        <p:cNvPr id="378" name="Shape 378"/>
+        <p:cNvPr id="391" name="Shape 391"/>
         <p:cNvGrpSpPr/>
         <p:nvPr/>
       </p:nvGrpSpPr>
@@ -28740,7 +29010,7 @@
       </p:grpSpPr>
       <p:sp>
         <p:nvSpPr>
-          <p:cNvPr id="379" name="Google Shape;379;p18"/>
+          <p:cNvPr id="392" name="Google Shape;392;p18"/>
           <p:cNvSpPr txBox="1"/>
           <p:nvPr>
             <p:ph type="title"/>
@@ -28792,7 +29062,7 @@
       </p:sp>
       <p:pic>
         <p:nvPicPr>
-          <p:cNvPr id="380" name="Google Shape;380;p18"/>
+          <p:cNvPr id="393" name="Google Shape;393;p18"/>
           <p:cNvPicPr preferRelativeResize="0"/>
           <p:nvPr/>
         </p:nvPicPr>
@@ -28819,7 +29089,7 @@
       </p:pic>
       <p:pic>
         <p:nvPicPr>
-          <p:cNvPr id="381" name="Google Shape;381;p18"/>
+          <p:cNvPr id="394" name="Google Shape;394;p18"/>
           <p:cNvPicPr preferRelativeResize="0"/>
           <p:nvPr/>
         </p:nvPicPr>
@@ -28869,7 +29139,7 @@
   <p:cSld>
     <p:spTree>
       <p:nvGrpSpPr>
-        <p:cNvPr id="385" name="Shape 385"/>
+        <p:cNvPr id="398" name="Shape 398"/>
         <p:cNvGrpSpPr/>
         <p:nvPr/>
       </p:nvGrpSpPr>
@@ -28883,7 +29153,7 @@
       </p:grpSpPr>
       <p:sp>
         <p:nvSpPr>
-          <p:cNvPr id="386" name="Google Shape;386;p19"/>
+          <p:cNvPr id="399" name="Google Shape;399;p19"/>
           <p:cNvSpPr txBox="1"/>
           <p:nvPr>
             <p:ph type="title"/>
@@ -28935,7 +29205,7 @@
       </p:sp>
       <p:pic>
         <p:nvPicPr>
-          <p:cNvPr id="387" name="Google Shape;387;p19"/>
+          <p:cNvPr id="400" name="Google Shape;400;p19"/>
           <p:cNvPicPr preferRelativeResize="0"/>
           <p:nvPr>
             <p:ph idx="1" type="body"/>
@@ -28964,7 +29234,7 @@
       </p:pic>
       <p:pic>
         <p:nvPicPr>
-          <p:cNvPr id="388" name="Google Shape;388;p19"/>
+          <p:cNvPr id="401" name="Google Shape;401;p19"/>
           <p:cNvPicPr preferRelativeResize="0"/>
           <p:nvPr/>
         </p:nvPicPr>
@@ -29014,7 +29284,7 @@
   <p:cSld>
     <p:spTree>
       <p:nvGrpSpPr>
-        <p:cNvPr id="392" name="Shape 392"/>
+        <p:cNvPr id="405" name="Shape 405"/>
         <p:cNvGrpSpPr/>
         <p:nvPr/>
       </p:nvGrpSpPr>
@@ -29028,7 +29298,7 @@
       </p:grpSpPr>
       <p:sp>
         <p:nvSpPr>
-          <p:cNvPr id="393" name="Google Shape;393;g2c3fbe12272_1_3"/>
+          <p:cNvPr id="406" name="Google Shape;406;g2c3fbe12272_1_3"/>
           <p:cNvSpPr txBox="1"/>
           <p:nvPr>
             <p:ph type="title"/>
@@ -29068,7 +29338,7 @@
       </p:sp>
       <p:pic>
         <p:nvPicPr>
-          <p:cNvPr id="394" name="Google Shape;394;g2c3fbe12272_1_3"/>
+          <p:cNvPr id="407" name="Google Shape;407;g2c3fbe12272_1_3"/>
           <p:cNvPicPr preferRelativeResize="0"/>
           <p:nvPr/>
         </p:nvPicPr>
@@ -29096,7 +29366,7 @@
       </p:pic>
       <p:pic>
         <p:nvPicPr>
-          <p:cNvPr id="395" name="Google Shape;395;g2c3fbe12272_1_3"/>
+          <p:cNvPr id="408" name="Google Shape;408;g2c3fbe12272_1_3"/>
           <p:cNvPicPr preferRelativeResize="0"/>
           <p:nvPr/>
         </p:nvPicPr>
@@ -29135,7 +29405,7 @@
   <p:cSld>
     <p:spTree>
       <p:nvGrpSpPr>
-        <p:cNvPr id="399" name="Shape 399"/>
+        <p:cNvPr id="412" name="Shape 412"/>
         <p:cNvGrpSpPr/>
         <p:nvPr/>
       </p:nvGrpSpPr>
@@ -29149,7 +29419,7 @@
       </p:grpSpPr>
       <p:sp>
         <p:nvSpPr>
-          <p:cNvPr id="400" name="Google Shape;400;p20"/>
+          <p:cNvPr id="413" name="Google Shape;413;p20"/>
           <p:cNvSpPr txBox="1"/>
           <p:nvPr>
             <p:ph type="title"/>
@@ -29201,7 +29471,7 @@
       </p:sp>
       <p:pic>
         <p:nvPicPr>
-          <p:cNvPr id="401" name="Google Shape;401;p20"/>
+          <p:cNvPr id="414" name="Google Shape;414;p20"/>
           <p:cNvPicPr preferRelativeResize="0"/>
           <p:nvPr>
             <p:ph idx="1" type="body"/>
@@ -29230,7 +29500,7 @@
       </p:pic>
       <p:pic>
         <p:nvPicPr>
-          <p:cNvPr id="402" name="Google Shape;402;p20"/>
+          <p:cNvPr id="415" name="Google Shape;415;p20"/>
           <p:cNvPicPr preferRelativeResize="0"/>
           <p:nvPr/>
         </p:nvPicPr>
@@ -29257,7 +29527,7 @@
       </p:pic>
       <p:sp>
         <p:nvSpPr>
-          <p:cNvPr id="403" name="Google Shape;403;p20"/>
+          <p:cNvPr id="416" name="Google Shape;416;p20"/>
           <p:cNvSpPr txBox="1"/>
           <p:nvPr/>
         </p:nvSpPr>
@@ -29534,7 +29804,7 @@
   <p:cSld>
     <p:spTree>
       <p:nvGrpSpPr>
-        <p:cNvPr id="407" name="Shape 407"/>
+        <p:cNvPr id="420" name="Shape 420"/>
         <p:cNvGrpSpPr/>
         <p:nvPr/>
       </p:nvGrpSpPr>
@@ -29548,7 +29818,7 @@
       </p:grpSpPr>
       <p:sp>
         <p:nvSpPr>
-          <p:cNvPr id="408" name="Google Shape;408;p21"/>
+          <p:cNvPr id="421" name="Google Shape;421;p21"/>
           <p:cNvSpPr txBox="1"/>
           <p:nvPr>
             <p:ph type="title"/>
@@ -29600,7 +29870,7 @@
       </p:sp>
       <p:pic>
         <p:nvPicPr>
-          <p:cNvPr id="409" name="Google Shape;409;p21"/>
+          <p:cNvPr id="422" name="Google Shape;422;p21"/>
           <p:cNvPicPr preferRelativeResize="0"/>
           <p:nvPr/>
         </p:nvPicPr>
@@ -29627,7 +29897,7 @@
       </p:pic>
       <p:pic>
         <p:nvPicPr>
-          <p:cNvPr id="410" name="Google Shape;410;p21"/>
+          <p:cNvPr id="423" name="Google Shape;423;p21"/>
           <p:cNvPicPr preferRelativeResize="0"/>
           <p:nvPr/>
         </p:nvPicPr>
@@ -29677,7 +29947,7 @@
   <p:cSld>
     <p:spTree>
       <p:nvGrpSpPr>
-        <p:cNvPr id="414" name="Shape 414"/>
+        <p:cNvPr id="427" name="Shape 427"/>
         <p:cNvGrpSpPr/>
         <p:nvPr/>
       </p:nvGrpSpPr>
@@ -29691,7 +29961,7 @@
       </p:grpSpPr>
       <p:sp>
         <p:nvSpPr>
-          <p:cNvPr id="415" name="Google Shape;415;g26aa17c3ece_0_8"/>
+          <p:cNvPr id="428" name="Google Shape;428;g26aa17c3ece_0_8"/>
           <p:cNvSpPr txBox="1"/>
           <p:nvPr>
             <p:ph type="title"/>
@@ -29731,7 +30001,7 @@
       </p:sp>
       <p:sp>
         <p:nvSpPr>
-          <p:cNvPr id="416" name="Google Shape;416;g26aa17c3ece_0_8"/>
+          <p:cNvPr id="429" name="Google Shape;429;g26aa17c3ece_0_8"/>
           <p:cNvSpPr txBox="1"/>
           <p:nvPr>
             <p:ph idx="1" type="body"/>
@@ -29827,7 +30097,7 @@
   <p:cSld>
     <p:spTree>
       <p:nvGrpSpPr>
-        <p:cNvPr id="420" name="Shape 420"/>
+        <p:cNvPr id="433" name="Shape 433"/>
         <p:cNvGrpSpPr/>
         <p:nvPr/>
       </p:nvGrpSpPr>
@@ -29841,7 +30111,7 @@
       </p:grpSpPr>
       <p:sp>
         <p:nvSpPr>
-          <p:cNvPr id="421" name="Google Shape;421;p22"/>
+          <p:cNvPr id="434" name="Google Shape;434;p22"/>
           <p:cNvSpPr txBox="1"/>
           <p:nvPr>
             <p:ph type="title"/>
@@ -29893,7 +30163,7 @@
       </p:sp>
       <p:sp>
         <p:nvSpPr>
-          <p:cNvPr id="422" name="Google Shape;422;p22"/>
+          <p:cNvPr id="435" name="Google Shape;435;p22"/>
           <p:cNvSpPr txBox="1"/>
           <p:nvPr>
             <p:ph idx="1" type="body"/>
@@ -29964,7 +30234,7 @@
   <p:cSld>
     <p:spTree>
       <p:nvGrpSpPr>
-        <p:cNvPr id="426" name="Shape 426"/>
+        <p:cNvPr id="439" name="Shape 439"/>
         <p:cNvGrpSpPr/>
         <p:nvPr/>
       </p:nvGrpSpPr>
@@ -29978,7 +30248,7 @@
       </p:grpSpPr>
       <p:sp>
         <p:nvSpPr>
-          <p:cNvPr id="427" name="Google Shape;427;g26b5081e801_0_19"/>
+          <p:cNvPr id="440" name="Google Shape;440;g26b5081e801_0_19"/>
           <p:cNvSpPr txBox="1"/>
           <p:nvPr>
             <p:ph type="title"/>
@@ -30030,7 +30300,7 @@
       </p:sp>
       <p:sp>
         <p:nvSpPr>
-          <p:cNvPr id="428" name="Google Shape;428;g26b5081e801_0_19"/>
+          <p:cNvPr id="441" name="Google Shape;441;g26b5081e801_0_19"/>
           <p:cNvSpPr txBox="1"/>
           <p:nvPr>
             <p:ph idx="1" type="body"/>
@@ -30118,7 +30388,7 @@
             </a:pPr>
             <a:r>
               <a:rPr lang="en-US"/>
-              <a:t>Deadline: April, 2</a:t>
+              <a:t>Deadline: April, 9</a:t>
             </a:r>
             <a:endParaRPr/>
           </a:p>
@@ -30217,66 +30487,6 @@
             <a:r>
               <a:rPr lang="en-US"/>
               <a:t>contact teachers</a:t>
-            </a:r>
-            <a:endParaRPr/>
-          </a:p>
-          <a:p>
-            <a:pPr indent="-342900" lvl="0" marL="457200" rtl="0" algn="l">
-              <a:lnSpc>
-                <a:spcPct val="100000"/>
-              </a:lnSpc>
-              <a:spcBef>
-                <a:spcPts val="0"/>
-              </a:spcBef>
-              <a:spcAft>
-                <a:spcPts val="0"/>
-              </a:spcAft>
-              <a:buSzPts val="1800"/>
-              <a:buChar char="▪"/>
-            </a:pPr>
-            <a:r>
-              <a:rPr lang="en-US"/>
-              <a:t>Where to make implementation and tests?</a:t>
-            </a:r>
-            <a:endParaRPr/>
-          </a:p>
-          <a:p>
-            <a:pPr indent="-342900" lvl="1" marL="914400" rtl="0" algn="l">
-              <a:lnSpc>
-                <a:spcPct val="100000"/>
-              </a:lnSpc>
-              <a:spcBef>
-                <a:spcPts val="0"/>
-              </a:spcBef>
-              <a:spcAft>
-                <a:spcPts val="0"/>
-              </a:spcAft>
-              <a:buSzPts val="1800"/>
-              <a:buChar char="•"/>
-            </a:pPr>
-            <a:r>
-              <a:rPr lang="en-US"/>
-              <a:t>llvm/labs/lab1</a:t>
-            </a:r>
-            <a:endParaRPr/>
-          </a:p>
-          <a:p>
-            <a:pPr indent="-342900" lvl="1" marL="914400" rtl="0" algn="l">
-              <a:lnSpc>
-                <a:spcPct val="100000"/>
-              </a:lnSpc>
-              <a:spcBef>
-                <a:spcPts val="0"/>
-              </a:spcBef>
-              <a:spcAft>
-                <a:spcPts val="0"/>
-              </a:spcAft>
-              <a:buSzPts val="1800"/>
-              <a:buChar char="•"/>
-            </a:pPr>
-            <a:r>
-              <a:rPr lang="en-US"/>
-              <a:t>llvm/test/lab1/&lt;surname_name&gt;</a:t>
             </a:r>
             <a:endParaRPr/>
           </a:p>
@@ -30303,11 +30513,11 @@
 </file>
 
 <file path=ppt/slides/slide34.xml><?xml version="1.0" encoding="utf-8"?>
-<p:sld xmlns:a="http://schemas.openxmlformats.org/drawingml/2006/main" xmlns:r="http://schemas.openxmlformats.org/officeDocument/2006/relationships" xmlns:mc="http://schemas.openxmlformats.org/markup-compatibility/2006" xmlns:mv="urn:schemas-microsoft-com:mac:vml" xmlns:p="http://schemas.openxmlformats.org/presentationml/2006/main" xmlns:c="http://schemas.openxmlformats.org/drawingml/2006/chart" xmlns:dgm="http://schemas.openxmlformats.org/drawingml/2006/diagram" xmlns:o="urn:schemas-microsoft-com:office:office" xmlns:v="urn:schemas-microsoft-com:vml" xmlns:pvml="urn:schemas-microsoft-com:office:powerpoint" xmlns:com="http://schemas.openxmlformats.org/drawingml/2006/compatibility" xmlns:p14="http://schemas.microsoft.com/office/powerpoint/2010/main" xmlns:p15="http://schemas.microsoft.com/office/powerpoint/2012/main" xmlns:ahyp="http://schemas.microsoft.com/office/drawing/2018/hyperlinkcolor">
+<p:sld xmlns:a="http://schemas.openxmlformats.org/drawingml/2006/main" xmlns:r="http://schemas.openxmlformats.org/officeDocument/2006/relationships" xmlns:mc="http://schemas.openxmlformats.org/markup-compatibility/2006" xmlns:mv="urn:schemas-microsoft-com:mac:vml" xmlns:p="http://schemas.openxmlformats.org/presentationml/2006/main" xmlns:c="http://schemas.openxmlformats.org/drawingml/2006/chart" xmlns:dgm="http://schemas.openxmlformats.org/drawingml/2006/diagram" xmlns:o="urn:schemas-microsoft-com:office:office" xmlns:v="urn:schemas-microsoft-com:vml" xmlns:pvml="urn:schemas-microsoft-com:office:powerpoint" xmlns:com="http://schemas.openxmlformats.org/drawingml/2006/compatibility" xmlns:p14="http://schemas.microsoft.com/office/powerpoint/2010/main" xmlns:p15="http://schemas.microsoft.com/office/powerpoint/2012/main" xmlns:ahyp="http://schemas.microsoft.com/office/drawing/2018/hyperlinkcolor" show="0">
   <p:cSld>
     <p:spTree>
       <p:nvGrpSpPr>
-        <p:cNvPr id="432" name="Shape 432"/>
+        <p:cNvPr id="445" name="Shape 445"/>
         <p:cNvGrpSpPr/>
         <p:nvPr/>
       </p:nvGrpSpPr>
@@ -30321,7 +30531,7 @@
       </p:grpSpPr>
       <p:sp>
         <p:nvSpPr>
-          <p:cNvPr id="433" name="Google Shape;433;g26b5081e801_0_477"/>
+          <p:cNvPr id="446" name="Google Shape;446;g26b5081e801_0_477"/>
           <p:cNvSpPr txBox="1"/>
           <p:nvPr>
             <p:ph type="title"/>
@@ -30361,7 +30571,7 @@
       </p:sp>
       <p:sp>
         <p:nvSpPr>
-          <p:cNvPr id="434" name="Google Shape;434;g26b5081e801_0_477"/>
+          <p:cNvPr id="447" name="Google Shape;447;g26b5081e801_0_477"/>
           <p:cNvSpPr txBox="1"/>
           <p:nvPr>
             <p:ph idx="1" type="body"/>
@@ -30434,7 +30644,7 @@
       </p:sp>
       <p:sp>
         <p:nvSpPr>
-          <p:cNvPr id="435" name="Google Shape;435;g26b5081e801_0_477"/>
+          <p:cNvPr id="448" name="Google Shape;448;g26b5081e801_0_477"/>
           <p:cNvSpPr txBox="1"/>
           <p:nvPr/>
         </p:nvSpPr>
@@ -30507,7 +30717,7 @@
       </p:sp>
       <p:pic>
         <p:nvPicPr>
-          <p:cNvPr id="436" name="Google Shape;436;g26b5081e801_0_477"/>
+          <p:cNvPr id="449" name="Google Shape;449;g26b5081e801_0_477"/>
           <p:cNvPicPr preferRelativeResize="0"/>
           <p:nvPr/>
         </p:nvPicPr>
@@ -30535,7 +30745,7 @@
       </p:pic>
       <p:pic>
         <p:nvPicPr>
-          <p:cNvPr id="437" name="Google Shape;437;g26b5081e801_0_477"/>
+          <p:cNvPr id="450" name="Google Shape;450;g26b5081e801_0_477"/>
           <p:cNvPicPr preferRelativeResize="0"/>
           <p:nvPr/>
         </p:nvPicPr>
@@ -30574,7 +30784,7 @@
   <p:cSld>
     <p:spTree>
       <p:nvGrpSpPr>
-        <p:cNvPr id="441" name="Shape 441"/>
+        <p:cNvPr id="454" name="Shape 454"/>
         <p:cNvGrpSpPr/>
         <p:nvPr/>
       </p:nvGrpSpPr>
@@ -30588,7 +30798,274 @@
       </p:grpSpPr>
       <p:sp>
         <p:nvSpPr>
-          <p:cNvPr id="442" name="Google Shape;442;p23"/>
+          <p:cNvPr id="455" name="Google Shape;455;g34113910fee_0_0"/>
+          <p:cNvSpPr txBox="1"/>
+          <p:nvPr>
+            <p:ph type="title"/>
+          </p:nvPr>
+        </p:nvSpPr>
+        <p:spPr>
+          <a:xfrm>
+            <a:off x="571370" y="571500"/>
+            <a:ext cx="11010900" cy="952500"/>
+          </a:xfrm>
+          <a:prstGeom prst="rect">
+            <a:avLst/>
+          </a:prstGeom>
+        </p:spPr>
+        <p:txBody>
+          <a:bodyPr anchorCtr="0" anchor="t" bIns="0" lIns="0" spcFirstLastPara="1" rIns="0" wrap="square" tIns="0">
+            <a:noAutofit/>
+          </a:bodyPr>
+          <a:lstStyle/>
+          <a:p>
+            <a:pPr indent="0" lvl="0" marL="0" rtl="0" algn="l">
+              <a:spcBef>
+                <a:spcPts val="0"/>
+              </a:spcBef>
+              <a:spcAft>
+                <a:spcPts val="0"/>
+              </a:spcAft>
+              <a:buNone/>
+            </a:pPr>
+            <a:r>
+              <a:rPr lang="en-US"/>
+              <a:t>Test</a:t>
+            </a:r>
+            <a:endParaRPr/>
+          </a:p>
+        </p:txBody>
+      </p:sp>
+      <p:sp>
+        <p:nvSpPr>
+          <p:cNvPr id="456" name="Google Shape;456;g34113910fee_0_0"/>
+          <p:cNvSpPr txBox="1"/>
+          <p:nvPr>
+            <p:ph idx="1" type="body"/>
+          </p:nvPr>
+        </p:nvSpPr>
+        <p:spPr>
+          <a:xfrm>
+            <a:off x="571370" y="1673454"/>
+            <a:ext cx="11010900" cy="4575000"/>
+          </a:xfrm>
+          <a:prstGeom prst="rect">
+            <a:avLst/>
+          </a:prstGeom>
+        </p:spPr>
+        <p:txBody>
+          <a:bodyPr anchorCtr="0" anchor="t" bIns="0" lIns="0" spcFirstLastPara="1" rIns="0" wrap="square" tIns="0">
+            <a:normAutofit/>
+          </a:bodyPr>
+          <a:lstStyle/>
+          <a:p>
+            <a:pPr indent="0" lvl="0" marL="0" rtl="0" algn="l">
+              <a:spcBef>
+                <a:spcPts val="1200"/>
+              </a:spcBef>
+              <a:spcAft>
+                <a:spcPts val="0"/>
+              </a:spcAft>
+              <a:buNone/>
+            </a:pPr>
+            <a:r>
+              <a:rPr lang="en-US" u="sng">
+                <a:solidFill>
+                  <a:schemeClr val="hlink"/>
+                </a:solidFill>
+                <a:hlinkClick r:id="rId3"/>
+              </a:rPr>
+              <a:t>https://forms.gle/ywfMNSijV2XqDiVF8</a:t>
+            </a:r>
+            <a:r>
+              <a:rPr lang="en-US"/>
+              <a:t> </a:t>
+            </a:r>
+            <a:endParaRPr/>
+          </a:p>
+          <a:p>
+            <a:pPr indent="0" lvl="0" marL="0" rtl="0" algn="l">
+              <a:spcBef>
+                <a:spcPts val="1200"/>
+              </a:spcBef>
+              <a:spcAft>
+                <a:spcPts val="0"/>
+              </a:spcAft>
+              <a:buNone/>
+            </a:pPr>
+            <a:r>
+              <a:rPr lang="en-US"/>
+              <a:t>Submission time: </a:t>
+            </a:r>
+            <a:r>
+              <a:rPr b="1" lang="en-US"/>
+              <a:t>10 minutes</a:t>
+            </a:r>
+            <a:r>
+              <a:rPr lang="en-US"/>
+              <a:t> </a:t>
+            </a:r>
+            <a:endParaRPr/>
+          </a:p>
+        </p:txBody>
+      </p:sp>
+      <p:sp>
+        <p:nvSpPr>
+          <p:cNvPr id="457" name="Google Shape;457;g34113910fee_0_0"/>
+          <p:cNvSpPr txBox="1"/>
+          <p:nvPr/>
+        </p:nvSpPr>
+        <p:spPr>
+          <a:xfrm>
+            <a:off x="8510750" y="6397900"/>
+            <a:ext cx="3356100" cy="492600"/>
+          </a:xfrm>
+          <a:prstGeom prst="rect">
+            <a:avLst/>
+          </a:prstGeom>
+          <a:noFill/>
+          <a:ln>
+            <a:noFill/>
+          </a:ln>
+        </p:spPr>
+        <p:txBody>
+          <a:bodyPr anchorCtr="0" anchor="t" bIns="91425" lIns="91425" spcFirstLastPara="1" rIns="91425" wrap="square" tIns="91425">
+            <a:spAutoFit/>
+          </a:bodyPr>
+          <a:lstStyle/>
+          <a:p>
+            <a:pPr indent="0" lvl="0" marL="0" rtl="0" algn="l">
+              <a:spcBef>
+                <a:spcPts val="0"/>
+              </a:spcBef>
+              <a:spcAft>
+                <a:spcPts val="0"/>
+              </a:spcAft>
+              <a:buNone/>
+            </a:pPr>
+            <a:r>
+              <a:rPr lang="en-US" sz="2000">
+                <a:solidFill>
+                  <a:srgbClr val="525252"/>
+                </a:solidFill>
+              </a:rPr>
+              <a:t>Backup: </a:t>
+            </a:r>
+            <a:r>
+              <a:rPr lang="en-US" sz="2000" u="sng">
+                <a:solidFill>
+                  <a:srgbClr val="0068B5"/>
+                </a:solidFill>
+                <a:hlinkClick r:id="rId4">
+                  <a:extLst>
+                    <a:ext uri="{A12FA001-AC4F-418D-AE19-62706E023703}">
+                      <ahyp:hlinkClr val="tx"/>
+                    </a:ext>
+                  </a:extLst>
+                </a:hlinkClick>
+              </a:rPr>
+              <a:t>me@gooddoog.ru</a:t>
+            </a:r>
+            <a:r>
+              <a:rPr lang="en-US" sz="2000">
+                <a:solidFill>
+                  <a:srgbClr val="525252"/>
+                </a:solidFill>
+              </a:rPr>
+              <a:t> </a:t>
+            </a:r>
+            <a:endParaRPr sz="2000">
+              <a:solidFill>
+                <a:srgbClr val="525252"/>
+              </a:solidFill>
+            </a:endParaRPr>
+          </a:p>
+        </p:txBody>
+      </p:sp>
+      <p:pic>
+        <p:nvPicPr>
+          <p:cNvPr id="458" name="Google Shape;458;g34113910fee_0_0"/>
+          <p:cNvPicPr preferRelativeResize="0"/>
+          <p:nvPr/>
+        </p:nvPicPr>
+        <p:blipFill>
+          <a:blip r:embed="rId5">
+            <a:alphaModFix/>
+          </a:blip>
+          <a:stretch>
+            <a:fillRect/>
+          </a:stretch>
+        </p:blipFill>
+        <p:spPr>
+          <a:xfrm>
+            <a:off x="8510750" y="1962150"/>
+            <a:ext cx="2971800" cy="2933700"/>
+          </a:xfrm>
+          <a:prstGeom prst="rect">
+            <a:avLst/>
+          </a:prstGeom>
+          <a:noFill/>
+          <a:ln>
+            <a:noFill/>
+          </a:ln>
+        </p:spPr>
+      </p:pic>
+      <p:pic>
+        <p:nvPicPr>
+          <p:cNvPr id="459" name="Google Shape;459;g34113910fee_0_0" title="Screenshot 2025-03-17 at 11.15.54.png"/>
+          <p:cNvPicPr preferRelativeResize="0"/>
+          <p:nvPr/>
+        </p:nvPicPr>
+        <p:blipFill>
+          <a:blip r:embed="rId6">
+            <a:alphaModFix/>
+          </a:blip>
+          <a:stretch>
+            <a:fillRect/>
+          </a:stretch>
+        </p:blipFill>
+        <p:spPr>
+          <a:xfrm>
+            <a:off x="476350" y="2771650"/>
+            <a:ext cx="7587874" cy="3961901"/>
+          </a:xfrm>
+          <a:prstGeom prst="rect">
+            <a:avLst/>
+          </a:prstGeom>
+          <a:noFill/>
+          <a:ln>
+            <a:noFill/>
+          </a:ln>
+        </p:spPr>
+      </p:pic>
+    </p:spTree>
+  </p:cSld>
+  <p:clrMapOvr>
+    <a:masterClrMapping/>
+  </p:clrMapOvr>
+</p:sld>
+</file>
+
+<file path=ppt/slides/slide36.xml><?xml version="1.0" encoding="utf-8"?>
+<p:sld xmlns:a="http://schemas.openxmlformats.org/drawingml/2006/main" xmlns:r="http://schemas.openxmlformats.org/officeDocument/2006/relationships" xmlns:mc="http://schemas.openxmlformats.org/markup-compatibility/2006" xmlns:mv="urn:schemas-microsoft-com:mac:vml" xmlns:p="http://schemas.openxmlformats.org/presentationml/2006/main" xmlns:c="http://schemas.openxmlformats.org/drawingml/2006/chart" xmlns:dgm="http://schemas.openxmlformats.org/drawingml/2006/diagram" xmlns:o="urn:schemas-microsoft-com:office:office" xmlns:v="urn:schemas-microsoft-com:vml" xmlns:pvml="urn:schemas-microsoft-com:office:powerpoint" xmlns:com="http://schemas.openxmlformats.org/drawingml/2006/compatibility" xmlns:p14="http://schemas.microsoft.com/office/powerpoint/2010/main" xmlns:p15="http://schemas.microsoft.com/office/powerpoint/2012/main" xmlns:ahyp="http://schemas.microsoft.com/office/drawing/2018/hyperlinkcolor">
+  <p:cSld>
+    <p:spTree>
+      <p:nvGrpSpPr>
+        <p:cNvPr id="463" name="Shape 463"/>
+        <p:cNvGrpSpPr/>
+        <p:nvPr/>
+      </p:nvGrpSpPr>
+      <p:grpSpPr>
+        <a:xfrm>
+          <a:off x="0" y="0"/>
+          <a:ext cx="0" cy="0"/>
+          <a:chOff x="0" y="0"/>
+          <a:chExt cx="0" cy="0"/>
+        </a:xfrm>
+      </p:grpSpPr>
+      <p:sp>
+        <p:nvSpPr>
+          <p:cNvPr id="464" name="Google Shape;464;p23"/>
           <p:cNvSpPr txBox="1"/>
           <p:nvPr>
             <p:ph type="title"/>
@@ -30640,7 +31117,7 @@
       </p:sp>
       <p:sp>
         <p:nvSpPr>
-          <p:cNvPr id="443" name="Google Shape;443;p23"/>
+          <p:cNvPr id="465" name="Google Shape;465;p23"/>
           <p:cNvSpPr txBox="1"/>
           <p:nvPr>
             <p:ph idx="1" type="body"/>
@@ -30794,12 +31271,12 @@
 </p:sld>
 </file>
 
-<file path=ppt/slides/slide36.xml><?xml version="1.0" encoding="utf-8"?>
+<file path=ppt/slides/slide37.xml><?xml version="1.0" encoding="utf-8"?>
 <p:sld xmlns:a="http://schemas.openxmlformats.org/drawingml/2006/main" xmlns:r="http://schemas.openxmlformats.org/officeDocument/2006/relationships" xmlns:mc="http://schemas.openxmlformats.org/markup-compatibility/2006" xmlns:mv="urn:schemas-microsoft-com:mac:vml" xmlns:p="http://schemas.openxmlformats.org/presentationml/2006/main" xmlns:c="http://schemas.openxmlformats.org/drawingml/2006/chart" xmlns:dgm="http://schemas.openxmlformats.org/drawingml/2006/diagram" xmlns:o="urn:schemas-microsoft-com:office:office" xmlns:v="urn:schemas-microsoft-com:vml" xmlns:pvml="urn:schemas-microsoft-com:office:powerpoint" xmlns:com="http://schemas.openxmlformats.org/drawingml/2006/compatibility" xmlns:p14="http://schemas.microsoft.com/office/powerpoint/2010/main" xmlns:p15="http://schemas.microsoft.com/office/powerpoint/2012/main" xmlns:ahyp="http://schemas.microsoft.com/office/drawing/2018/hyperlinkcolor">
   <p:cSld>
     <p:spTree>
       <p:nvGrpSpPr>
-        <p:cNvPr id="447" name="Shape 447"/>
+        <p:cNvPr id="469" name="Shape 469"/>
         <p:cNvGrpSpPr/>
         <p:nvPr/>
       </p:nvGrpSpPr>
@@ -31865,19 +32342,6 @@
               <a:rPr lang="en-US"/>
               <a:t>SCCP: </a:t>
             </a:r>
-            <a:r>
-              <a:rPr lang="en-US" u="sng">
-                <a:solidFill>
-                  <a:schemeClr val="hlink"/>
-                </a:solidFill>
-                <a:hlinkClick r:id="rId3"/>
-              </a:rPr>
-              <a:t>https://godbolt.org/z/vYzMohM3e</a:t>
-            </a:r>
-            <a:r>
-              <a:rPr lang="en-US"/>
-              <a:t> </a:t>
-            </a:r>
             <a:endParaRPr/>
           </a:p>
         </p:txBody>
@@ -31889,7 +32353,7 @@
           <p:nvPr/>
         </p:nvPicPr>
         <p:blipFill>
-          <a:blip r:embed="rId4">
+          <a:blip r:embed="rId3">
             <a:alphaModFix/>
           </a:blip>
           <a:stretch>
@@ -31910,6 +32374,169 @@
           </a:ln>
         </p:spPr>
       </p:pic>
+      <p:grpSp>
+        <p:nvGrpSpPr>
+          <p:cNvPr id="260" name="Google Shape;260;g26b5081e801_0_0"/>
+          <p:cNvGrpSpPr/>
+          <p:nvPr/>
+        </p:nvGrpSpPr>
+        <p:grpSpPr>
+          <a:xfrm>
+            <a:off x="67275" y="6313238"/>
+            <a:ext cx="5188500" cy="445275"/>
+            <a:chOff x="289925" y="5611838"/>
+            <a:chExt cx="5188500" cy="445275"/>
+          </a:xfrm>
+        </p:grpSpPr>
+        <p:sp>
+          <p:nvSpPr>
+            <p:cNvPr id="261" name="Google Shape;261;g26b5081e801_0_0"/>
+            <p:cNvSpPr/>
+            <p:nvPr/>
+          </p:nvSpPr>
+          <p:spPr>
+            <a:xfrm>
+              <a:off x="289925" y="5611850"/>
+              <a:ext cx="5188500" cy="445200"/>
+            </a:xfrm>
+            <a:prstGeom prst="rect">
+              <a:avLst/>
+            </a:prstGeom>
+            <a:solidFill>
+              <a:srgbClr val="FFFFFF"/>
+            </a:solidFill>
+            <a:ln cap="flat" cmpd="sng" w="9525">
+              <a:solidFill>
+                <a:srgbClr val="000000"/>
+              </a:solidFill>
+              <a:prstDash val="solid"/>
+              <a:round/>
+              <a:headEnd len="sm" w="sm" type="none"/>
+              <a:tailEnd len="sm" w="sm" type="none"/>
+            </a:ln>
+          </p:spPr>
+          <p:txBody>
+            <a:bodyPr anchorCtr="0" anchor="ctr" bIns="91425" lIns="91425" spcFirstLastPara="1" rIns="91425" wrap="square" tIns="91425">
+              <a:noAutofit/>
+            </a:bodyPr>
+            <a:lstStyle/>
+            <a:p>
+              <a:pPr indent="0" lvl="0" marL="0" rtl="0" algn="l">
+                <a:spcBef>
+                  <a:spcPts val="0"/>
+                </a:spcBef>
+                <a:spcAft>
+                  <a:spcPts val="0"/>
+                </a:spcAft>
+                <a:buNone/>
+              </a:pPr>
+              <a:r>
+                <a:t/>
+              </a:r>
+              <a:endParaRPr sz="2400">
+                <a:solidFill>
+                  <a:srgbClr val="000000"/>
+                </a:solidFill>
+              </a:endParaRPr>
+            </a:p>
+          </p:txBody>
+        </p:sp>
+        <p:pic>
+          <p:nvPicPr>
+            <p:cNvPr id="262" name="Google Shape;262;g26b5081e801_0_0"/>
+            <p:cNvPicPr preferRelativeResize="0"/>
+            <p:nvPr/>
+          </p:nvPicPr>
+          <p:blipFill>
+            <a:blip r:embed="rId4">
+              <a:alphaModFix/>
+            </a:blip>
+            <a:stretch>
+              <a:fillRect/>
+            </a:stretch>
+          </p:blipFill>
+          <p:spPr>
+            <a:xfrm>
+              <a:off x="289925" y="5611838"/>
+              <a:ext cx="445275" cy="445275"/>
+            </a:xfrm>
+            <a:prstGeom prst="rect">
+              <a:avLst/>
+            </a:prstGeom>
+            <a:noFill/>
+            <a:ln>
+              <a:noFill/>
+            </a:ln>
+          </p:spPr>
+        </p:pic>
+        <p:sp>
+          <p:nvSpPr>
+            <p:cNvPr id="263" name="Google Shape;263;g26b5081e801_0_0"/>
+            <p:cNvSpPr/>
+            <p:nvPr/>
+          </p:nvSpPr>
+          <p:spPr>
+            <a:xfrm>
+              <a:off x="777375" y="5611850"/>
+              <a:ext cx="4701000" cy="445200"/>
+            </a:xfrm>
+            <a:prstGeom prst="rect">
+              <a:avLst/>
+            </a:prstGeom>
+            <a:solidFill>
+              <a:srgbClr val="FFFFFF"/>
+            </a:solidFill>
+            <a:ln cap="flat" cmpd="sng" w="9525">
+              <a:solidFill>
+                <a:srgbClr val="000000"/>
+              </a:solidFill>
+              <a:prstDash val="solid"/>
+              <a:round/>
+              <a:headEnd len="sm" w="sm" type="none"/>
+              <a:tailEnd len="sm" w="sm" type="none"/>
+            </a:ln>
+          </p:spPr>
+          <p:txBody>
+            <a:bodyPr anchorCtr="0" anchor="ctr" bIns="91425" lIns="91425" spcFirstLastPara="1" rIns="91425" wrap="square" tIns="91425">
+              <a:noAutofit/>
+            </a:bodyPr>
+            <a:lstStyle/>
+            <a:p>
+              <a:pPr indent="0" lvl="0" marL="0" rtl="0" algn="l">
+                <a:lnSpc>
+                  <a:spcPct val="90000"/>
+                </a:lnSpc>
+                <a:spcBef>
+                  <a:spcPts val="0"/>
+                </a:spcBef>
+                <a:spcAft>
+                  <a:spcPts val="0"/>
+                </a:spcAft>
+                <a:buClr>
+                  <a:srgbClr val="000000"/>
+                </a:buClr>
+                <a:buSzPts val="2400"/>
+                <a:buFont typeface="Arial"/>
+                <a:buNone/>
+              </a:pPr>
+              <a:r>
+                <a:rPr lang="en-US" sz="2400" u="sng">
+                  <a:solidFill>
+                    <a:schemeClr val="hlink"/>
+                  </a:solidFill>
+                  <a:hlinkClick r:id="rId5"/>
+                </a:rPr>
+                <a:t>https://godbolt.org/z/vYzMohM3e</a:t>
+              </a:r>
+              <a:r>
+                <a:rPr lang="en-US" sz="2400"/>
+                <a:t> </a:t>
+              </a:r>
+              <a:endParaRPr sz="2400"/>
+            </a:p>
+          </p:txBody>
+        </p:sp>
+      </p:grpSp>
     </p:spTree>
   </p:cSld>
   <p:clrMapOvr>
@@ -31923,7 +32550,7 @@
   <p:cSld>
     <p:spTree>
       <p:nvGrpSpPr>
-        <p:cNvPr id="263" name="Shape 263"/>
+        <p:cNvPr id="267" name="Shape 267"/>
         <p:cNvGrpSpPr/>
         <p:nvPr/>
       </p:nvGrpSpPr>
@@ -31937,7 +32564,7 @@
       </p:grpSpPr>
       <p:sp>
         <p:nvSpPr>
-          <p:cNvPr id="264" name="Google Shape;264;g26b5081e801_0_443"/>
+          <p:cNvPr id="268" name="Google Shape;268;g26b5081e801_0_443"/>
           <p:cNvSpPr txBox="1"/>
           <p:nvPr>
             <p:ph type="title"/>
@@ -31977,7 +32604,7 @@
       </p:sp>
       <p:sp>
         <p:nvSpPr>
-          <p:cNvPr id="265" name="Google Shape;265;g26b5081e801_0_443"/>
+          <p:cNvPr id="269" name="Google Shape;269;g26b5081e801_0_443"/>
           <p:cNvSpPr txBox="1"/>
           <p:nvPr>
             <p:ph idx="1" type="body"/>
@@ -32016,7 +32643,7 @@
       </p:sp>
       <p:pic>
         <p:nvPicPr>
-          <p:cNvPr id="266" name="Google Shape;266;g26b5081e801_0_443"/>
+          <p:cNvPr id="270" name="Google Shape;270;g26b5081e801_0_443"/>
           <p:cNvPicPr preferRelativeResize="0"/>
           <p:nvPr/>
         </p:nvPicPr>
@@ -32044,7 +32671,7 @@
       </p:pic>
       <p:sp>
         <p:nvSpPr>
-          <p:cNvPr id="267" name="Google Shape;267;g26b5081e801_0_443"/>
+          <p:cNvPr id="271" name="Google Shape;271;g26b5081e801_0_443"/>
           <p:cNvSpPr txBox="1"/>
           <p:nvPr/>
         </p:nvSpPr>
@@ -32144,6 +32771,210 @@
           </a:p>
         </p:txBody>
       </p:sp>
+      <p:sp>
+        <p:nvSpPr>
+          <p:cNvPr id="272" name="Google Shape;272;g26b5081e801_0_443"/>
+          <p:cNvSpPr txBox="1"/>
+          <p:nvPr/>
+        </p:nvSpPr>
+        <p:spPr>
+          <a:xfrm>
+            <a:off x="0" y="0"/>
+            <a:ext cx="3000000" cy="400200"/>
+          </a:xfrm>
+          <a:prstGeom prst="rect">
+            <a:avLst/>
+          </a:prstGeom>
+          <a:noFill/>
+          <a:ln>
+            <a:noFill/>
+          </a:ln>
+        </p:spPr>
+        <p:txBody>
+          <a:bodyPr anchorCtr="0" anchor="t" bIns="91425" lIns="91425" spcFirstLastPara="1" rIns="91425" wrap="square" tIns="91425">
+            <a:spAutoFit/>
+          </a:bodyPr>
+          <a:lstStyle/>
+          <a:p>
+            <a:pPr indent="0" lvl="0" marL="0" rtl="0" algn="l">
+              <a:spcBef>
+                <a:spcPts val="0"/>
+              </a:spcBef>
+              <a:spcAft>
+                <a:spcPts val="0"/>
+              </a:spcAft>
+              <a:buNone/>
+            </a:pPr>
+            <a:r>
+              <a:t/>
+            </a:r>
+            <a:endParaRPr/>
+          </a:p>
+        </p:txBody>
+      </p:sp>
+      <p:grpSp>
+        <p:nvGrpSpPr>
+          <p:cNvPr id="273" name="Google Shape;273;g26b5081e801_0_443"/>
+          <p:cNvGrpSpPr/>
+          <p:nvPr/>
+        </p:nvGrpSpPr>
+        <p:grpSpPr>
+          <a:xfrm>
+            <a:off x="67275" y="6313238"/>
+            <a:ext cx="5188500" cy="445275"/>
+            <a:chOff x="289925" y="5611838"/>
+            <a:chExt cx="5188500" cy="445275"/>
+          </a:xfrm>
+        </p:grpSpPr>
+        <p:sp>
+          <p:nvSpPr>
+            <p:cNvPr id="274" name="Google Shape;274;g26b5081e801_0_443"/>
+            <p:cNvSpPr/>
+            <p:nvPr/>
+          </p:nvSpPr>
+          <p:spPr>
+            <a:xfrm>
+              <a:off x="289925" y="5611850"/>
+              <a:ext cx="5188500" cy="445200"/>
+            </a:xfrm>
+            <a:prstGeom prst="rect">
+              <a:avLst/>
+            </a:prstGeom>
+            <a:solidFill>
+              <a:srgbClr val="FFFFFF"/>
+            </a:solidFill>
+            <a:ln cap="flat" cmpd="sng" w="9525">
+              <a:solidFill>
+                <a:srgbClr val="000000"/>
+              </a:solidFill>
+              <a:prstDash val="solid"/>
+              <a:round/>
+              <a:headEnd len="sm" w="sm" type="none"/>
+              <a:tailEnd len="sm" w="sm" type="none"/>
+            </a:ln>
+          </p:spPr>
+          <p:txBody>
+            <a:bodyPr anchorCtr="0" anchor="ctr" bIns="91425" lIns="91425" spcFirstLastPara="1" rIns="91425" wrap="square" tIns="91425">
+              <a:noAutofit/>
+            </a:bodyPr>
+            <a:lstStyle/>
+            <a:p>
+              <a:pPr indent="0" lvl="0" marL="0" rtl="0" algn="l">
+                <a:spcBef>
+                  <a:spcPts val="0"/>
+                </a:spcBef>
+                <a:spcAft>
+                  <a:spcPts val="0"/>
+                </a:spcAft>
+                <a:buNone/>
+              </a:pPr>
+              <a:r>
+                <a:t/>
+              </a:r>
+              <a:endParaRPr sz="2400">
+                <a:solidFill>
+                  <a:srgbClr val="000000"/>
+                </a:solidFill>
+              </a:endParaRPr>
+            </a:p>
+          </p:txBody>
+        </p:sp>
+        <p:pic>
+          <p:nvPicPr>
+            <p:cNvPr id="275" name="Google Shape;275;g26b5081e801_0_443"/>
+            <p:cNvPicPr preferRelativeResize="0"/>
+            <p:nvPr/>
+          </p:nvPicPr>
+          <p:blipFill>
+            <a:blip r:embed="rId4">
+              <a:alphaModFix/>
+            </a:blip>
+            <a:stretch>
+              <a:fillRect/>
+            </a:stretch>
+          </p:blipFill>
+          <p:spPr>
+            <a:xfrm>
+              <a:off x="289925" y="5611838"/>
+              <a:ext cx="445275" cy="445275"/>
+            </a:xfrm>
+            <a:prstGeom prst="rect">
+              <a:avLst/>
+            </a:prstGeom>
+            <a:noFill/>
+            <a:ln>
+              <a:noFill/>
+            </a:ln>
+          </p:spPr>
+        </p:pic>
+        <p:sp>
+          <p:nvSpPr>
+            <p:cNvPr id="276" name="Google Shape;276;g26b5081e801_0_443"/>
+            <p:cNvSpPr/>
+            <p:nvPr/>
+          </p:nvSpPr>
+          <p:spPr>
+            <a:xfrm>
+              <a:off x="777375" y="5611850"/>
+              <a:ext cx="4701000" cy="445200"/>
+            </a:xfrm>
+            <a:prstGeom prst="rect">
+              <a:avLst/>
+            </a:prstGeom>
+            <a:solidFill>
+              <a:srgbClr val="FFFFFF"/>
+            </a:solidFill>
+            <a:ln cap="flat" cmpd="sng" w="9525">
+              <a:solidFill>
+                <a:srgbClr val="000000"/>
+              </a:solidFill>
+              <a:prstDash val="solid"/>
+              <a:round/>
+              <a:headEnd len="sm" w="sm" type="none"/>
+              <a:tailEnd len="sm" w="sm" type="none"/>
+            </a:ln>
+          </p:spPr>
+          <p:txBody>
+            <a:bodyPr anchorCtr="0" anchor="ctr" bIns="91425" lIns="91425" spcFirstLastPara="1" rIns="91425" wrap="square" tIns="91425">
+              <a:noAutofit/>
+            </a:bodyPr>
+            <a:lstStyle/>
+            <a:p>
+              <a:pPr indent="0" lvl="0" marL="0" rtl="0" algn="l">
+                <a:lnSpc>
+                  <a:spcPct val="90000"/>
+                </a:lnSpc>
+                <a:spcBef>
+                  <a:spcPts val="0"/>
+                </a:spcBef>
+                <a:spcAft>
+                  <a:spcPts val="0"/>
+                </a:spcAft>
+                <a:buClr>
+                  <a:srgbClr val="000000"/>
+                </a:buClr>
+                <a:buSzPts val="2400"/>
+                <a:buFont typeface="Arial"/>
+                <a:buNone/>
+              </a:pPr>
+              <a:r>
+                <a:rPr lang="en-US" sz="2400" u="sng">
+                  <a:solidFill>
+                    <a:schemeClr val="hlink"/>
+                  </a:solidFill>
+                  <a:hlinkClick r:id="rId5"/>
+                </a:rPr>
+                <a:t>https://godbolt.org/z/T6bWarjjK</a:t>
+              </a:r>
+              <a:r>
+                <a:rPr lang="en-US" sz="2400"/>
+                <a:t> </a:t>
+              </a:r>
+              <a:endParaRPr sz="2400"/>
+            </a:p>
+          </p:txBody>
+        </p:sp>
+      </p:grpSp>
     </p:spTree>
   </p:cSld>
   <p:clrMapOvr>

</xml_diff>